<commit_message>
notebook and colab slides
Expanded instructions on downloading the notebooks and uploading them to colab
</commit_message>
<xml_diff>
--- a/Intro.pptx
+++ b/Intro.pptx
@@ -25,37 +25,38 @@
     <p:sldId id="371" r:id="rId19"/>
     <p:sldId id="415" r:id="rId20"/>
     <p:sldId id="423" r:id="rId21"/>
-    <p:sldId id="425" r:id="rId22"/>
-    <p:sldId id="301" r:id="rId23"/>
-    <p:sldId id="294" r:id="rId24"/>
-    <p:sldId id="289" r:id="rId25"/>
-    <p:sldId id="290" r:id="rId26"/>
-    <p:sldId id="295" r:id="rId27"/>
-    <p:sldId id="296" r:id="rId28"/>
-    <p:sldId id="372" r:id="rId29"/>
-    <p:sldId id="373" r:id="rId30"/>
-    <p:sldId id="426" r:id="rId31"/>
-    <p:sldId id="323" r:id="rId32"/>
-    <p:sldId id="324" r:id="rId33"/>
-    <p:sldId id="325" r:id="rId34"/>
-    <p:sldId id="326" r:id="rId35"/>
-    <p:sldId id="298" r:id="rId36"/>
-    <p:sldId id="318" r:id="rId37"/>
-    <p:sldId id="319" r:id="rId38"/>
-    <p:sldId id="315" r:id="rId39"/>
-    <p:sldId id="316" r:id="rId40"/>
-    <p:sldId id="421" r:id="rId41"/>
-    <p:sldId id="302" r:id="rId42"/>
-    <p:sldId id="312" r:id="rId43"/>
-    <p:sldId id="321" r:id="rId44"/>
-    <p:sldId id="422" r:id="rId45"/>
-    <p:sldId id="257" r:id="rId46"/>
-    <p:sldId id="258" r:id="rId47"/>
-    <p:sldId id="263" r:id="rId48"/>
-    <p:sldId id="265" r:id="rId49"/>
-    <p:sldId id="269" r:id="rId50"/>
-    <p:sldId id="270" r:id="rId51"/>
-    <p:sldId id="313" r:id="rId52"/>
+    <p:sldId id="427" r:id="rId22"/>
+    <p:sldId id="425" r:id="rId23"/>
+    <p:sldId id="301" r:id="rId24"/>
+    <p:sldId id="294" r:id="rId25"/>
+    <p:sldId id="289" r:id="rId26"/>
+    <p:sldId id="290" r:id="rId27"/>
+    <p:sldId id="295" r:id="rId28"/>
+    <p:sldId id="296" r:id="rId29"/>
+    <p:sldId id="372" r:id="rId30"/>
+    <p:sldId id="373" r:id="rId31"/>
+    <p:sldId id="426" r:id="rId32"/>
+    <p:sldId id="323" r:id="rId33"/>
+    <p:sldId id="324" r:id="rId34"/>
+    <p:sldId id="325" r:id="rId35"/>
+    <p:sldId id="326" r:id="rId36"/>
+    <p:sldId id="298" r:id="rId37"/>
+    <p:sldId id="318" r:id="rId38"/>
+    <p:sldId id="319" r:id="rId39"/>
+    <p:sldId id="315" r:id="rId40"/>
+    <p:sldId id="316" r:id="rId41"/>
+    <p:sldId id="421" r:id="rId42"/>
+    <p:sldId id="302" r:id="rId43"/>
+    <p:sldId id="312" r:id="rId44"/>
+    <p:sldId id="321" r:id="rId45"/>
+    <p:sldId id="422" r:id="rId46"/>
+    <p:sldId id="257" r:id="rId47"/>
+    <p:sldId id="258" r:id="rId48"/>
+    <p:sldId id="263" r:id="rId49"/>
+    <p:sldId id="265" r:id="rId50"/>
+    <p:sldId id="269" r:id="rId51"/>
+    <p:sldId id="270" r:id="rId52"/>
+    <p:sldId id="313" r:id="rId53"/>
   </p:sldIdLst>
   <p:sldSz cx="12192000" cy="6858000"/>
   <p:notesSz cx="6858000" cy="9144000"/>
@@ -167,6 +168,7 @@
   <p1510:revLst>
     <p1510:client id="{23D8B655-52C4-473C-BC09-E42846206E2D}" v="151" dt="2023-04-27T19:43:44.032"/>
     <p1510:client id="{283757E5-C4D9-4FBA-8AE3-B4E2FCA9AB31}" v="465" dt="2023-03-29T08:14:00.632"/>
+    <p1510:client id="{439F81E0-47B7-51A1-3ADA-5A1A3DC89784}" v="691" dt="2023-05-23T18:55:45.601"/>
   </p1510:revLst>
 </p1510:revInfo>
 </file>
@@ -893,7 +895,7 @@
           <a:p>
             <a:fld id="{6ACDB02D-298E-4694-859A-BF6474DEFEA3}" type="datetimeFigureOut">
               <a:rPr lang="nl-NL" smtClean="0"/>
-              <a:t>27-4-2023</a:t>
+              <a:t>23-5-2023</a:t>
             </a:fld>
             <a:endParaRPr lang="nl-NL"/>
           </a:p>
@@ -1139,7 +1141,7 @@
           <a:p>
             <a:fld id="{6ACDB02D-298E-4694-859A-BF6474DEFEA3}" type="datetimeFigureOut">
               <a:rPr lang="nl-NL" smtClean="0"/>
-              <a:t>27-4-2023</a:t>
+              <a:t>23-5-2023</a:t>
             </a:fld>
             <a:endParaRPr lang="nl-NL"/>
           </a:p>
@@ -1448,7 +1450,7 @@
           <a:p>
             <a:fld id="{6ACDB02D-298E-4694-859A-BF6474DEFEA3}" type="datetimeFigureOut">
               <a:rPr lang="nl-NL" smtClean="0"/>
-              <a:t>27-4-2023</a:t>
+              <a:t>23-5-2023</a:t>
             </a:fld>
             <a:endParaRPr lang="nl-NL"/>
           </a:p>
@@ -1784,7 +1786,7 @@
           <a:p>
             <a:fld id="{6ACDB02D-298E-4694-859A-BF6474DEFEA3}" type="datetimeFigureOut">
               <a:rPr lang="nl-NL" smtClean="0"/>
-              <a:t>27-4-2023</a:t>
+              <a:t>23-5-2023</a:t>
             </a:fld>
             <a:endParaRPr lang="nl-NL"/>
           </a:p>
@@ -2093,7 +2095,7 @@
           <a:p>
             <a:fld id="{6ACDB02D-298E-4694-859A-BF6474DEFEA3}" type="datetimeFigureOut">
               <a:rPr lang="nl-NL" smtClean="0"/>
-              <a:t>27-4-2023</a:t>
+              <a:t>23-5-2023</a:t>
             </a:fld>
             <a:endParaRPr lang="nl-NL"/>
           </a:p>
@@ -2481,7 +2483,7 @@
           <a:p>
             <a:fld id="{6ACDB02D-298E-4694-859A-BF6474DEFEA3}" type="datetimeFigureOut">
               <a:rPr lang="nl-NL" smtClean="0"/>
-              <a:t>27-4-2023</a:t>
+              <a:t>23-5-2023</a:t>
             </a:fld>
             <a:endParaRPr lang="nl-NL"/>
           </a:p>
@@ -2646,7 +2648,7 @@
           <a:p>
             <a:fld id="{6ACDB02D-298E-4694-859A-BF6474DEFEA3}" type="datetimeFigureOut">
               <a:rPr lang="nl-NL" smtClean="0"/>
-              <a:t>27-4-2023</a:t>
+              <a:t>23-5-2023</a:t>
             </a:fld>
             <a:endParaRPr lang="nl-NL"/>
           </a:p>
@@ -2821,7 +2823,7 @@
           <a:p>
             <a:fld id="{6ACDB02D-298E-4694-859A-BF6474DEFEA3}" type="datetimeFigureOut">
               <a:rPr lang="nl-NL" smtClean="0"/>
-              <a:t>27-4-2023</a:t>
+              <a:t>23-5-2023</a:t>
             </a:fld>
             <a:endParaRPr lang="nl-NL"/>
           </a:p>
@@ -2992,7 +2994,7 @@
           <a:p>
             <a:fld id="{6ACDB02D-298E-4694-859A-BF6474DEFEA3}" type="datetimeFigureOut">
               <a:rPr lang="nl-NL" smtClean="0"/>
-              <a:t>27-4-2023</a:t>
+              <a:t>23-5-2023</a:t>
             </a:fld>
             <a:endParaRPr lang="nl-NL"/>
           </a:p>
@@ -3234,7 +3236,7 @@
           <a:p>
             <a:fld id="{6ACDB02D-298E-4694-859A-BF6474DEFEA3}" type="datetimeFigureOut">
               <a:rPr lang="nl-NL" smtClean="0"/>
-              <a:t>27-4-2023</a:t>
+              <a:t>23-5-2023</a:t>
             </a:fld>
             <a:endParaRPr lang="nl-NL"/>
           </a:p>
@@ -3461,7 +3463,7 @@
           <a:p>
             <a:fld id="{6ACDB02D-298E-4694-859A-BF6474DEFEA3}" type="datetimeFigureOut">
               <a:rPr lang="nl-NL" smtClean="0"/>
-              <a:t>27-4-2023</a:t>
+              <a:t>23-5-2023</a:t>
             </a:fld>
             <a:endParaRPr lang="nl-NL"/>
           </a:p>
@@ -3830,7 +3832,7 @@
           <a:p>
             <a:fld id="{6ACDB02D-298E-4694-859A-BF6474DEFEA3}" type="datetimeFigureOut">
               <a:rPr lang="nl-NL" smtClean="0"/>
-              <a:t>27-4-2023</a:t>
+              <a:t>23-5-2023</a:t>
             </a:fld>
             <a:endParaRPr lang="nl-NL"/>
           </a:p>
@@ -3948,7 +3950,7 @@
           <a:p>
             <a:fld id="{6ACDB02D-298E-4694-859A-BF6474DEFEA3}" type="datetimeFigureOut">
               <a:rPr lang="nl-NL" smtClean="0"/>
-              <a:t>27-4-2023</a:t>
+              <a:t>23-5-2023</a:t>
             </a:fld>
             <a:endParaRPr lang="nl-NL"/>
           </a:p>
@@ -4038,7 +4040,7 @@
           <a:p>
             <a:fld id="{6ACDB02D-298E-4694-859A-BF6474DEFEA3}" type="datetimeFigureOut">
               <a:rPr lang="nl-NL" smtClean="0"/>
-              <a:t>27-4-2023</a:t>
+              <a:t>23-5-2023</a:t>
             </a:fld>
             <a:endParaRPr lang="nl-NL"/>
           </a:p>
@@ -4288,7 +4290,7 @@
           <a:p>
             <a:fld id="{6ACDB02D-298E-4694-859A-BF6474DEFEA3}" type="datetimeFigureOut">
               <a:rPr lang="nl-NL" smtClean="0"/>
-              <a:t>27-4-2023</a:t>
+              <a:t>23-5-2023</a:t>
             </a:fld>
             <a:endParaRPr lang="nl-NL"/>
           </a:p>
@@ -4546,7 +4548,7 @@
           <a:p>
             <a:fld id="{6ACDB02D-298E-4694-859A-BF6474DEFEA3}" type="datetimeFigureOut">
               <a:rPr lang="nl-NL" smtClean="0"/>
-              <a:t>27-4-2023</a:t>
+              <a:t>23-5-2023</a:t>
             </a:fld>
             <a:endParaRPr lang="nl-NL"/>
           </a:p>
@@ -5284,7 +5286,7 @@
           <a:p>
             <a:fld id="{6ACDB02D-298E-4694-859A-BF6474DEFEA3}" type="datetimeFigureOut">
               <a:rPr lang="nl-NL" smtClean="0"/>
-              <a:t>27-4-2023</a:t>
+              <a:t>23-5-2023</a:t>
             </a:fld>
             <a:endParaRPr lang="nl-NL"/>
           </a:p>
@@ -10932,212 +10934,20 @@
         </p:blipFill>
         <p:spPr>
           <a:xfrm>
-            <a:off x="723901" y="848863"/>
-            <a:ext cx="4096883" cy="3028788"/>
+            <a:off x="238126" y="877438"/>
+            <a:ext cx="5763758" cy="4257513"/>
           </a:xfrm>
           <a:prstGeom prst="rect">
             <a:avLst/>
           </a:prstGeom>
         </p:spPr>
       </p:pic>
-      <p:sp>
-        <p:nvSpPr>
-          <p:cNvPr id="5" name="Titel 1">
+      <p:cxnSp>
+        <p:nvCxnSpPr>
+          <p:cNvPr id="2" name="Straight Arrow Connector 1">
             <a:extLst>
               <a:ext uri="{FF2B5EF4-FFF2-40B4-BE49-F238E27FC236}">
-                <a16:creationId xmlns:a16="http://schemas.microsoft.com/office/drawing/2014/main" id="{C3EC70A2-E912-9E17-C391-9CDD4F7ED71E}"/>
-              </a:ext>
-            </a:extLst>
-          </p:cNvPr>
-          <p:cNvSpPr>
-            <a:spLocks noGrp="1"/>
-          </p:cNvSpPr>
-          <p:nvPr/>
-        </p:nvSpPr>
-        <p:spPr>
-          <a:xfrm>
-            <a:off x="5370652" y="5905500"/>
-            <a:ext cx="6007873" cy="768350"/>
-          </a:xfrm>
-          <a:prstGeom prst="rect">
-            <a:avLst/>
-          </a:prstGeom>
-        </p:spPr>
-        <p:txBody>
-          <a:bodyPr vert="horz" lIns="91440" tIns="45720" rIns="91440" bIns="45720" rtlCol="0" anchor="t">
-            <a:normAutofit/>
-          </a:bodyPr>
-          <a:lstStyle>
-            <a:lvl1pPr algn="l" defTabSz="457200" rtl="0" eaLnBrk="1" latinLnBrk="0" hangingPunct="1">
-              <a:spcBef>
-                <a:spcPct val="0"/>
-              </a:spcBef>
-              <a:buNone/>
-              <a:defRPr sz="3600" kern="1200">
-                <a:solidFill>
-                  <a:schemeClr val="accent1"/>
-                </a:solidFill>
-                <a:latin typeface="+mj-lt"/>
-                <a:ea typeface="+mj-ea"/>
-                <a:cs typeface="+mj-cs"/>
-              </a:defRPr>
-            </a:lvl1pPr>
-            <a:lvl2pPr eaLnBrk="1" hangingPunct="1">
-              <a:defRPr>
-                <a:solidFill>
-                  <a:schemeClr val="tx2"/>
-                </a:solidFill>
-              </a:defRPr>
-            </a:lvl2pPr>
-            <a:lvl3pPr eaLnBrk="1" hangingPunct="1">
-              <a:defRPr>
-                <a:solidFill>
-                  <a:schemeClr val="tx2"/>
-                </a:solidFill>
-              </a:defRPr>
-            </a:lvl3pPr>
-            <a:lvl4pPr eaLnBrk="1" hangingPunct="1">
-              <a:defRPr>
-                <a:solidFill>
-                  <a:schemeClr val="tx2"/>
-                </a:solidFill>
-              </a:defRPr>
-            </a:lvl4pPr>
-            <a:lvl5pPr eaLnBrk="1" hangingPunct="1">
-              <a:defRPr>
-                <a:solidFill>
-                  <a:schemeClr val="tx2"/>
-                </a:solidFill>
-              </a:defRPr>
-            </a:lvl5pPr>
-            <a:lvl6pPr eaLnBrk="1" hangingPunct="1">
-              <a:defRPr>
-                <a:solidFill>
-                  <a:schemeClr val="tx2"/>
-                </a:solidFill>
-              </a:defRPr>
-            </a:lvl6pPr>
-            <a:lvl7pPr eaLnBrk="1" hangingPunct="1">
-              <a:defRPr>
-                <a:solidFill>
-                  <a:schemeClr val="tx2"/>
-                </a:solidFill>
-              </a:defRPr>
-            </a:lvl7pPr>
-            <a:lvl8pPr eaLnBrk="1" hangingPunct="1">
-              <a:defRPr>
-                <a:solidFill>
-                  <a:schemeClr val="tx2"/>
-                </a:solidFill>
-              </a:defRPr>
-            </a:lvl8pPr>
-            <a:lvl9pPr eaLnBrk="1" hangingPunct="1">
-              <a:defRPr>
-                <a:solidFill>
-                  <a:schemeClr val="tx2"/>
-                </a:solidFill>
-              </a:defRPr>
-            </a:lvl9pPr>
-          </a:lstStyle>
-          <a:p>
-            <a:pPr algn="ctr"/>
-            <a:r>
-              <a:rPr lang="en-US" dirty="0">
-                <a:solidFill>
-                  <a:schemeClr val="tx1"/>
-                </a:solidFill>
-                <a:ea typeface="+mj-lt"/>
-                <a:cs typeface="+mj-lt"/>
-              </a:rPr>
-              <a:t>colab.research.google.com</a:t>
-            </a:r>
-            <a:endParaRPr lang="nl-NL" dirty="0">
-              <a:solidFill>
-                <a:schemeClr val="tx1"/>
-              </a:solidFill>
-              <a:ea typeface="+mj-lt"/>
-              <a:cs typeface="+mj-lt"/>
-            </a:endParaRPr>
-          </a:p>
-        </p:txBody>
-      </p:sp>
-      <p:pic>
-        <p:nvPicPr>
-          <p:cNvPr id="7" name="Afbeelding 4" descr="Afbeelding met tekst&#10;&#10;Automatisch gegenereerde beschrijving">
-            <a:extLst>
-              <a:ext uri="{FF2B5EF4-FFF2-40B4-BE49-F238E27FC236}">
-                <a16:creationId xmlns:a16="http://schemas.microsoft.com/office/drawing/2014/main" id="{30A5CE3E-F9E0-FC17-083B-F876B89A61B6}"/>
-              </a:ext>
-            </a:extLst>
-          </p:cNvPr>
-          <p:cNvPicPr>
-            <a:picLocks noChangeAspect="1"/>
-          </p:cNvPicPr>
-          <p:nvPr/>
-        </p:nvPicPr>
-        <p:blipFill rotWithShape="1">
-          <a:blip r:embed="rId3"/>
-          <a:srcRect l="4756" t="2241" r="2828" b="46379"/>
-          <a:stretch/>
-        </p:blipFill>
-        <p:spPr>
-          <a:xfrm>
-            <a:off x="5202656" y="3067050"/>
-            <a:ext cx="6853110" cy="2837609"/>
-          </a:xfrm>
-          <a:prstGeom prst="rect">
-            <a:avLst/>
-          </a:prstGeom>
-        </p:spPr>
-      </p:pic>
-      <p:sp>
-        <p:nvSpPr>
-          <p:cNvPr id="8" name="TextBox 7">
-            <a:extLst>
-              <a:ext uri="{FF2B5EF4-FFF2-40B4-BE49-F238E27FC236}">
-                <a16:creationId xmlns:a16="http://schemas.microsoft.com/office/drawing/2014/main" id="{B4C64D6A-E2D2-B149-0923-D3D56B70EDDA}"/>
-              </a:ext>
-            </a:extLst>
-          </p:cNvPr>
-          <p:cNvSpPr txBox="1"/>
-          <p:nvPr/>
-        </p:nvSpPr>
-        <p:spPr>
-          <a:xfrm>
-            <a:off x="5086349" y="1095375"/>
-            <a:ext cx="3286125" cy="646331"/>
-          </a:xfrm>
-          <a:prstGeom prst="rect">
-            <a:avLst/>
-          </a:prstGeom>
-          <a:noFill/>
-        </p:spPr>
-        <p:txBody>
-          <a:bodyPr rot="0" spcFirstLastPara="0" vertOverflow="overflow" horzOverflow="overflow" vert="horz" wrap="square" lIns="91440" tIns="45720" rIns="91440" bIns="45720" numCol="1" spcCol="0" rtlCol="0" fromWordArt="0" anchor="t" anchorCtr="0" forceAA="0" compatLnSpc="1">
-            <a:prstTxWarp prst="textNoShape">
-              <a:avLst/>
-            </a:prstTxWarp>
-            <a:spAutoFit/>
-          </a:bodyPr>
-          <a:lstStyle/>
-          <a:p>
-            <a:r>
-              <a:rPr lang="en-US" sz="3600" dirty="0">
-                <a:solidFill>
-                  <a:schemeClr val="accent4"/>
-                </a:solidFill>
-              </a:rPr>
-              <a:t>Stap 1</a:t>
-            </a:r>
-          </a:p>
-        </p:txBody>
-      </p:sp>
-      <p:cxnSp>
-        <p:nvCxnSpPr>
-          <p:cNvPr id="9" name="Straight Arrow Connector 8">
-            <a:extLst>
-              <a:ext uri="{FF2B5EF4-FFF2-40B4-BE49-F238E27FC236}">
-                <a16:creationId xmlns:a16="http://schemas.microsoft.com/office/drawing/2014/main" id="{DEFF8803-F790-89EA-EF95-4BF2616A1303}"/>
+                <a16:creationId xmlns:a16="http://schemas.microsoft.com/office/drawing/2014/main" id="{C008EF1D-1C41-C1F9-C3CE-45A4E3FFC9B7}"/>
               </a:ext>
             </a:extLst>
           </p:cNvPr>
@@ -11146,401 +10956,17 @@
         </p:nvCxnSpPr>
         <p:spPr>
           <a:xfrm>
-            <a:off x="4943475" y="952500"/>
-            <a:ext cx="0" cy="3143250"/>
+            <a:off x="5962650" y="1190625"/>
+            <a:ext cx="790575" cy="85725"/>
           </a:xfrm>
           <a:prstGeom prst="straightConnector1">
             <a:avLst/>
           </a:prstGeom>
           <a:ln w="57150">
             <a:solidFill>
-              <a:schemeClr val="accent4"/>
+              <a:schemeClr val="accent1"/>
             </a:solidFill>
-          </a:ln>
-        </p:spPr>
-        <p:style>
-          <a:lnRef idx="1">
-            <a:schemeClr val="accent1"/>
-          </a:lnRef>
-          <a:fillRef idx="0">
-            <a:schemeClr val="accent1"/>
-          </a:fillRef>
-          <a:effectRef idx="0">
-            <a:schemeClr val="accent1"/>
-          </a:effectRef>
-          <a:fontRef idx="minor">
-            <a:schemeClr val="tx1"/>
-          </a:fontRef>
-        </p:style>
-      </p:cxnSp>
-      <p:cxnSp>
-        <p:nvCxnSpPr>
-          <p:cNvPr id="10" name="Straight Arrow Connector 9">
-            <a:extLst>
-              <a:ext uri="{FF2B5EF4-FFF2-40B4-BE49-F238E27FC236}">
-                <a16:creationId xmlns:a16="http://schemas.microsoft.com/office/drawing/2014/main" id="{E30C63F4-21BC-B8A3-D78C-298E632B6CE6}"/>
-              </a:ext>
-            </a:extLst>
-          </p:cNvPr>
-          <p:cNvCxnSpPr/>
-          <p:nvPr/>
-        </p:nvCxnSpPr>
-        <p:spPr>
-          <a:xfrm flipV="1">
-            <a:off x="628650" y="4095750"/>
-            <a:ext cx="4314825" cy="9525"/>
-          </a:xfrm>
-          <a:prstGeom prst="straightConnector1">
-            <a:avLst/>
-          </a:prstGeom>
-          <a:ln w="57150">
-            <a:solidFill>
-              <a:schemeClr val="accent4"/>
-            </a:solidFill>
-          </a:ln>
-        </p:spPr>
-        <p:style>
-          <a:lnRef idx="1">
-            <a:schemeClr val="accent1"/>
-          </a:lnRef>
-          <a:fillRef idx="0">
-            <a:schemeClr val="accent1"/>
-          </a:fillRef>
-          <a:effectRef idx="0">
-            <a:schemeClr val="accent1"/>
-          </a:effectRef>
-          <a:fontRef idx="minor">
-            <a:schemeClr val="tx1"/>
-          </a:fontRef>
-        </p:style>
-      </p:cxnSp>
-      <p:cxnSp>
-        <p:nvCxnSpPr>
-          <p:cNvPr id="11" name="Straight Arrow Connector 10">
-            <a:extLst>
-              <a:ext uri="{FF2B5EF4-FFF2-40B4-BE49-F238E27FC236}">
-                <a16:creationId xmlns:a16="http://schemas.microsoft.com/office/drawing/2014/main" id="{E4265F6B-A439-60A2-5E69-C42C31EE2B8C}"/>
-              </a:ext>
-            </a:extLst>
-          </p:cNvPr>
-          <p:cNvCxnSpPr>
-            <a:cxnSpLocks/>
-          </p:cNvCxnSpPr>
-          <p:nvPr/>
-        </p:nvCxnSpPr>
-        <p:spPr>
-          <a:xfrm>
-            <a:off x="4943475" y="952499"/>
-            <a:ext cx="5753100" cy="0"/>
-          </a:xfrm>
-          <a:prstGeom prst="straightConnector1">
-            <a:avLst/>
-          </a:prstGeom>
-          <a:ln w="57150">
-            <a:solidFill>
-              <a:schemeClr val="accent4"/>
-            </a:solidFill>
-          </a:ln>
-        </p:spPr>
-        <p:style>
-          <a:lnRef idx="1">
-            <a:schemeClr val="accent1"/>
-          </a:lnRef>
-          <a:fillRef idx="0">
-            <a:schemeClr val="accent1"/>
-          </a:fillRef>
-          <a:effectRef idx="0">
-            <a:schemeClr val="accent1"/>
-          </a:effectRef>
-          <a:fontRef idx="minor">
-            <a:schemeClr val="tx1"/>
-          </a:fontRef>
-        </p:style>
-      </p:cxnSp>
-      <p:cxnSp>
-        <p:nvCxnSpPr>
-          <p:cNvPr id="12" name="Straight Arrow Connector 11">
-            <a:extLst>
-              <a:ext uri="{FF2B5EF4-FFF2-40B4-BE49-F238E27FC236}">
-                <a16:creationId xmlns:a16="http://schemas.microsoft.com/office/drawing/2014/main" id="{C1735D20-8D78-C5C7-302F-F6A69C2FC8C6}"/>
-              </a:ext>
-            </a:extLst>
-          </p:cNvPr>
-          <p:cNvCxnSpPr>
-            <a:cxnSpLocks/>
-          </p:cNvCxnSpPr>
-          <p:nvPr/>
-        </p:nvCxnSpPr>
-        <p:spPr>
-          <a:xfrm>
-            <a:off x="10687050" y="152399"/>
-            <a:ext cx="0" cy="800100"/>
-          </a:xfrm>
-          <a:prstGeom prst="straightConnector1">
-            <a:avLst/>
-          </a:prstGeom>
-          <a:ln w="57150">
-            <a:solidFill>
-              <a:schemeClr val="accent4"/>
-            </a:solidFill>
-          </a:ln>
-        </p:spPr>
-        <p:style>
-          <a:lnRef idx="1">
-            <a:schemeClr val="accent1"/>
-          </a:lnRef>
-          <a:fillRef idx="0">
-            <a:schemeClr val="accent1"/>
-          </a:fillRef>
-          <a:effectRef idx="0">
-            <a:schemeClr val="accent1"/>
-          </a:effectRef>
-          <a:fontRef idx="minor">
-            <a:schemeClr val="tx1"/>
-          </a:fontRef>
-        </p:style>
-      </p:cxnSp>
-      <p:cxnSp>
-        <p:nvCxnSpPr>
-          <p:cNvPr id="13" name="Straight Arrow Connector 12">
-            <a:extLst>
-              <a:ext uri="{FF2B5EF4-FFF2-40B4-BE49-F238E27FC236}">
-                <a16:creationId xmlns:a16="http://schemas.microsoft.com/office/drawing/2014/main" id="{AA5CA6A0-D4FA-713F-A2DB-30AE284E82B2}"/>
-              </a:ext>
-            </a:extLst>
-          </p:cNvPr>
-          <p:cNvCxnSpPr>
-            <a:cxnSpLocks/>
-          </p:cNvCxnSpPr>
-          <p:nvPr/>
-        </p:nvCxnSpPr>
-        <p:spPr>
-          <a:xfrm flipV="1">
-            <a:off x="533400" y="133349"/>
-            <a:ext cx="10163175" cy="38100"/>
-          </a:xfrm>
-          <a:prstGeom prst="straightConnector1">
-            <a:avLst/>
-          </a:prstGeom>
-          <a:ln w="57150">
-            <a:solidFill>
-              <a:schemeClr val="accent4"/>
-            </a:solidFill>
-          </a:ln>
-        </p:spPr>
-        <p:style>
-          <a:lnRef idx="1">
-            <a:schemeClr val="accent1"/>
-          </a:lnRef>
-          <a:fillRef idx="0">
-            <a:schemeClr val="accent1"/>
-          </a:fillRef>
-          <a:effectRef idx="0">
-            <a:schemeClr val="accent1"/>
-          </a:effectRef>
-          <a:fontRef idx="minor">
-            <a:schemeClr val="tx1"/>
-          </a:fontRef>
-        </p:style>
-      </p:cxnSp>
-      <p:cxnSp>
-        <p:nvCxnSpPr>
-          <p:cNvPr id="14" name="Straight Arrow Connector 13">
-            <a:extLst>
-              <a:ext uri="{FF2B5EF4-FFF2-40B4-BE49-F238E27FC236}">
-                <a16:creationId xmlns:a16="http://schemas.microsoft.com/office/drawing/2014/main" id="{5CEF7CEF-19D8-9070-7B05-0FF708D0BA53}"/>
-              </a:ext>
-            </a:extLst>
-          </p:cNvPr>
-          <p:cNvCxnSpPr>
-            <a:cxnSpLocks/>
-          </p:cNvCxnSpPr>
-          <p:nvPr/>
-        </p:nvCxnSpPr>
-        <p:spPr>
-          <a:xfrm flipH="1" flipV="1">
-            <a:off x="552450" y="171449"/>
-            <a:ext cx="66675" cy="3933825"/>
-          </a:xfrm>
-          <a:prstGeom prst="straightConnector1">
-            <a:avLst/>
-          </a:prstGeom>
-          <a:ln w="57150">
-            <a:solidFill>
-              <a:schemeClr val="accent4"/>
-            </a:solidFill>
-          </a:ln>
-        </p:spPr>
-        <p:style>
-          <a:lnRef idx="1">
-            <a:schemeClr val="accent1"/>
-          </a:lnRef>
-          <a:fillRef idx="0">
-            <a:schemeClr val="accent1"/>
-          </a:fillRef>
-          <a:effectRef idx="0">
-            <a:schemeClr val="accent1"/>
-          </a:effectRef>
-          <a:fontRef idx="minor">
-            <a:schemeClr val="tx1"/>
-          </a:fontRef>
-        </p:style>
-      </p:cxnSp>
-      <p:cxnSp>
-        <p:nvCxnSpPr>
-          <p:cNvPr id="15" name="Straight Arrow Connector 14">
-            <a:extLst>
-              <a:ext uri="{FF2B5EF4-FFF2-40B4-BE49-F238E27FC236}">
-                <a16:creationId xmlns:a16="http://schemas.microsoft.com/office/drawing/2014/main" id="{EAF909D2-05C4-9F0A-B3B0-602131D1FEC2}"/>
-              </a:ext>
-            </a:extLst>
-          </p:cNvPr>
-          <p:cNvCxnSpPr>
-            <a:cxnSpLocks/>
-          </p:cNvCxnSpPr>
-          <p:nvPr/>
-        </p:nvCxnSpPr>
-        <p:spPr>
-          <a:xfrm flipV="1">
-            <a:off x="5153025" y="3019424"/>
-            <a:ext cx="6905625" cy="0"/>
-          </a:xfrm>
-          <a:prstGeom prst="straightConnector1">
-            <a:avLst/>
-          </a:prstGeom>
-          <a:ln w="57150">
-            <a:solidFill>
-              <a:srgbClr val="0070C0"/>
-            </a:solidFill>
-          </a:ln>
-        </p:spPr>
-        <p:style>
-          <a:lnRef idx="1">
-            <a:schemeClr val="accent1"/>
-          </a:lnRef>
-          <a:fillRef idx="0">
-            <a:schemeClr val="accent1"/>
-          </a:fillRef>
-          <a:effectRef idx="0">
-            <a:schemeClr val="accent1"/>
-          </a:effectRef>
-          <a:fontRef idx="minor">
-            <a:schemeClr val="tx1"/>
-          </a:fontRef>
-        </p:style>
-      </p:cxnSp>
-      <p:cxnSp>
-        <p:nvCxnSpPr>
-          <p:cNvPr id="16" name="Straight Arrow Connector 15">
-            <a:extLst>
-              <a:ext uri="{FF2B5EF4-FFF2-40B4-BE49-F238E27FC236}">
-                <a16:creationId xmlns:a16="http://schemas.microsoft.com/office/drawing/2014/main" id="{54F04786-A7CF-9CD5-D6C8-B08EB8F28A3D}"/>
-              </a:ext>
-            </a:extLst>
-          </p:cNvPr>
-          <p:cNvCxnSpPr>
-            <a:cxnSpLocks/>
-          </p:cNvCxnSpPr>
-          <p:nvPr/>
-        </p:nvCxnSpPr>
-        <p:spPr>
-          <a:xfrm flipH="1" flipV="1">
-            <a:off x="12049124" y="3000374"/>
-            <a:ext cx="28575" cy="3476625"/>
-          </a:xfrm>
-          <a:prstGeom prst="straightConnector1">
-            <a:avLst/>
-          </a:prstGeom>
-          <a:ln w="57150">
-            <a:solidFill>
-              <a:srgbClr val="0070C0"/>
-            </a:solidFill>
-          </a:ln>
-        </p:spPr>
-        <p:style>
-          <a:lnRef idx="1">
-            <a:schemeClr val="accent1"/>
-          </a:lnRef>
-          <a:fillRef idx="0">
-            <a:schemeClr val="accent1"/>
-          </a:fillRef>
-          <a:effectRef idx="0">
-            <a:schemeClr val="accent1"/>
-          </a:effectRef>
-          <a:fontRef idx="minor">
-            <a:schemeClr val="tx1"/>
-          </a:fontRef>
-        </p:style>
-      </p:cxnSp>
-      <p:cxnSp>
-        <p:nvCxnSpPr>
-          <p:cNvPr id="17" name="Straight Arrow Connector 16">
-            <a:extLst>
-              <a:ext uri="{FF2B5EF4-FFF2-40B4-BE49-F238E27FC236}">
-                <a16:creationId xmlns:a16="http://schemas.microsoft.com/office/drawing/2014/main" id="{2A53B4F1-43C9-EDC1-DEBA-9962DA8FBDAC}"/>
-              </a:ext>
-            </a:extLst>
-          </p:cNvPr>
-          <p:cNvCxnSpPr>
-            <a:cxnSpLocks/>
-          </p:cNvCxnSpPr>
-          <p:nvPr/>
-        </p:nvCxnSpPr>
-        <p:spPr>
-          <a:xfrm flipH="1" flipV="1">
-            <a:off x="5191124" y="6429374"/>
-            <a:ext cx="6819900" cy="66675"/>
-          </a:xfrm>
-          <a:prstGeom prst="straightConnector1">
-            <a:avLst/>
-          </a:prstGeom>
-          <a:ln w="57150">
-            <a:solidFill>
-              <a:srgbClr val="0070C0"/>
-            </a:solidFill>
-          </a:ln>
-        </p:spPr>
-        <p:style>
-          <a:lnRef idx="1">
-            <a:schemeClr val="accent1"/>
-          </a:lnRef>
-          <a:fillRef idx="0">
-            <a:schemeClr val="accent1"/>
-          </a:fillRef>
-          <a:effectRef idx="0">
-            <a:schemeClr val="accent1"/>
-          </a:effectRef>
-          <a:fontRef idx="minor">
-            <a:schemeClr val="tx1"/>
-          </a:fontRef>
-        </p:style>
-      </p:cxnSp>
-      <p:cxnSp>
-        <p:nvCxnSpPr>
-          <p:cNvPr id="18" name="Straight Arrow Connector 17">
-            <a:extLst>
-              <a:ext uri="{FF2B5EF4-FFF2-40B4-BE49-F238E27FC236}">
-                <a16:creationId xmlns:a16="http://schemas.microsoft.com/office/drawing/2014/main" id="{6231B629-2299-F2FE-6ACA-469BFDAC8FD0}"/>
-              </a:ext>
-            </a:extLst>
-          </p:cNvPr>
-          <p:cNvCxnSpPr>
-            <a:cxnSpLocks/>
-          </p:cNvCxnSpPr>
-          <p:nvPr/>
-        </p:nvCxnSpPr>
-        <p:spPr>
-          <a:xfrm>
-            <a:off x="5133974" y="3019424"/>
-            <a:ext cx="0" cy="3400425"/>
-          </a:xfrm>
-          <a:prstGeom prst="straightConnector1">
-            <a:avLst/>
-          </a:prstGeom>
-          <a:ln w="57150">
-            <a:solidFill>
-              <a:srgbClr val="0070C0"/>
-            </a:solidFill>
+            <a:tailEnd type="triangle"/>
           </a:ln>
         </p:spPr>
         <p:style>
@@ -11560,10 +10986,10 @@
       </p:cxnSp>
       <p:sp>
         <p:nvSpPr>
-          <p:cNvPr id="19" name="TextBox 18">
+          <p:cNvPr id="6" name="TextBox 5">
             <a:extLst>
               <a:ext uri="{FF2B5EF4-FFF2-40B4-BE49-F238E27FC236}">
-                <a16:creationId xmlns:a16="http://schemas.microsoft.com/office/drawing/2014/main" id="{A408D0C9-61C4-01C9-E7FD-B3648CB6C0B0}"/>
+                <a16:creationId xmlns:a16="http://schemas.microsoft.com/office/drawing/2014/main" id="{AB4B407B-482B-5B5D-B2D6-BF119FBD435B}"/>
               </a:ext>
             </a:extLst>
           </p:cNvPr>
@@ -11572,18 +10998,13 @@
         </p:nvSpPr>
         <p:spPr>
           <a:xfrm>
-            <a:off x="3238499" y="5000624"/>
-            <a:ext cx="1581150" cy="646331"/>
+            <a:off x="6724649" y="1085850"/>
+            <a:ext cx="4848225" cy="2554545"/>
           </a:xfrm>
           <a:prstGeom prst="rect">
             <a:avLst/>
           </a:prstGeom>
           <a:noFill/>
-          <a:ln>
-            <a:solidFill>
-              <a:srgbClr val="0070C0"/>
-            </a:solidFill>
-          </a:ln>
         </p:spPr>
         <p:txBody>
           <a:bodyPr rot="0" spcFirstLastPara="0" vertOverflow="overflow" horzOverflow="overflow" vert="horz" wrap="square" lIns="91440" tIns="45720" rIns="91440" bIns="45720" numCol="1" spcCol="0" rtlCol="0" fromWordArt="0" anchor="t" anchorCtr="0" forceAA="0" compatLnSpc="1">
@@ -11594,17 +11015,155 @@
           </a:bodyPr>
           <a:lstStyle/>
           <a:p>
-            <a:r>
-              <a:rPr lang="en-US" sz="3600" dirty="0">
-                <a:solidFill>
-                  <a:srgbClr val="0070C0"/>
-                </a:solidFill>
-              </a:rPr>
-              <a:t>Stap 2</a:t>
-            </a:r>
+            <a:pPr marL="342900" indent="-342900">
+              <a:buAutoNum type="arabicPeriod"/>
+            </a:pPr>
+            <a:r>
+              <a:rPr lang="en-US" sz="2000" err="1"/>
+              <a:t>Klik</a:t>
+            </a:r>
+            <a:r>
+              <a:rPr lang="en-US" sz="2000" dirty="0"/>
+              <a:t> op </a:t>
+            </a:r>
+            <a:r>
+              <a:rPr lang="en-US" sz="2000" err="1"/>
+              <a:t>groene</a:t>
+            </a:r>
+            <a:r>
+              <a:rPr lang="en-US" sz="2000" dirty="0"/>
+              <a:t> knop met 'Code'</a:t>
+            </a:r>
+          </a:p>
+          <a:p>
+            <a:pPr marL="342900" indent="-342900">
+              <a:buAutoNum type="arabicPeriod"/>
+            </a:pPr>
+            <a:endParaRPr lang="en-US" sz="2000" dirty="0"/>
+          </a:p>
+          <a:p>
+            <a:pPr marL="342900" indent="-342900">
+              <a:buAutoNum type="arabicPeriod"/>
+            </a:pPr>
+            <a:r>
+              <a:rPr lang="en-US" sz="2000" dirty="0"/>
+              <a:t>Download ZIP (</a:t>
+            </a:r>
+            <a:r>
+              <a:rPr lang="en-US" sz="2000" dirty="0" err="1"/>
+              <a:t>onthoud</a:t>
+            </a:r>
+            <a:r>
+              <a:rPr lang="en-US" sz="2000" dirty="0"/>
+              <a:t> de </a:t>
+            </a:r>
+            <a:r>
+              <a:rPr lang="en-US" sz="2000" dirty="0" err="1"/>
+              <a:t>locatie</a:t>
+            </a:r>
+            <a:r>
+              <a:rPr lang="en-US" sz="2000" dirty="0"/>
+              <a:t>)</a:t>
+            </a:r>
+            <a:endParaRPr lang="en-US" dirty="0"/>
+          </a:p>
+          <a:p>
+            <a:endParaRPr lang="en-US" sz="2000" dirty="0"/>
+          </a:p>
+          <a:p>
+            <a:r>
+              <a:rPr lang="en-US" sz="2000" dirty="0"/>
+              <a:t>3. Pak ZIP </a:t>
+            </a:r>
+            <a:r>
+              <a:rPr lang="en-US" sz="2000" dirty="0" err="1"/>
+              <a:t>uit</a:t>
+            </a:r>
+            <a:r>
+              <a:rPr lang="en-US" sz="2000" dirty="0"/>
+              <a:t> (</a:t>
+            </a:r>
+            <a:r>
+              <a:rPr lang="en-US" sz="2000" dirty="0" err="1"/>
+              <a:t>onthoud</a:t>
+            </a:r>
+            <a:r>
+              <a:rPr lang="en-US" sz="2000" dirty="0"/>
+              <a:t> de </a:t>
+            </a:r>
+            <a:r>
+              <a:rPr lang="en-US" sz="2000" dirty="0" err="1"/>
+              <a:t>locatie</a:t>
+            </a:r>
+            <a:r>
+              <a:rPr lang="en-US" sz="2000" dirty="0"/>
+              <a:t>)</a:t>
+            </a:r>
+          </a:p>
+          <a:p>
+            <a:pPr marL="342900" indent="-342900">
+              <a:buAutoNum type="arabicPeriod"/>
+            </a:pPr>
+            <a:endParaRPr lang="en-US" sz="2000" dirty="0"/>
+          </a:p>
+          <a:p>
+            <a:pPr marL="342900" indent="-342900">
+              <a:buAutoNum type="arabicPeriod"/>
+            </a:pPr>
+            <a:endParaRPr lang="en-US" sz="2000" dirty="0"/>
+          </a:p>
+          <a:p>
+            <a:pPr marL="342900" indent="-342900">
+              <a:buAutoNum type="arabicPeriod"/>
+            </a:pPr>
+            <a:endParaRPr lang="en-US" sz="2000" dirty="0"/>
           </a:p>
         </p:txBody>
       </p:sp>
+      <p:cxnSp>
+        <p:nvCxnSpPr>
+          <p:cNvPr id="20" name="Straight Arrow Connector 19">
+            <a:extLst>
+              <a:ext uri="{FF2B5EF4-FFF2-40B4-BE49-F238E27FC236}">
+                <a16:creationId xmlns:a16="http://schemas.microsoft.com/office/drawing/2014/main" id="{5FD296EC-A245-470C-637F-0949B8F0CE58}"/>
+              </a:ext>
+            </a:extLst>
+          </p:cNvPr>
+          <p:cNvCxnSpPr>
+            <a:cxnSpLocks/>
+          </p:cNvCxnSpPr>
+          <p:nvPr/>
+        </p:nvCxnSpPr>
+        <p:spPr>
+          <a:xfrm flipV="1">
+            <a:off x="2266950" y="1933575"/>
+            <a:ext cx="4467225" cy="2914650"/>
+          </a:xfrm>
+          <a:prstGeom prst="straightConnector1">
+            <a:avLst/>
+          </a:prstGeom>
+          <a:ln w="57150">
+            <a:solidFill>
+              <a:schemeClr val="accent1"/>
+            </a:solidFill>
+            <a:tailEnd type="triangle"/>
+          </a:ln>
+        </p:spPr>
+        <p:style>
+          <a:lnRef idx="1">
+            <a:schemeClr val="accent1"/>
+          </a:lnRef>
+          <a:fillRef idx="0">
+            <a:schemeClr val="accent1"/>
+          </a:fillRef>
+          <a:effectRef idx="0">
+            <a:schemeClr val="accent1"/>
+          </a:effectRef>
+          <a:fontRef idx="minor">
+            <a:schemeClr val="tx1"/>
+          </a:fontRef>
+        </p:style>
+      </p:cxnSp>
     </p:spTree>
     <p:extLst>
       <p:ext uri="{BB962C8B-B14F-4D97-AF65-F5344CB8AC3E}">
@@ -11619,6 +11178,503 @@
 </file>
 
 <file path=ppt/slides/slide21.xml><?xml version="1.0" encoding="utf-8"?>
+<p:sld xmlns:a="http://schemas.openxmlformats.org/drawingml/2006/main" xmlns:r="http://schemas.openxmlformats.org/officeDocument/2006/relationships" xmlns:p="http://schemas.openxmlformats.org/presentationml/2006/main">
+  <p:cSld>
+    <p:spTree>
+      <p:nvGrpSpPr>
+        <p:cNvPr id="1" name=""/>
+        <p:cNvGrpSpPr/>
+        <p:nvPr/>
+      </p:nvGrpSpPr>
+      <p:grpSpPr>
+        <a:xfrm>
+          <a:off x="0" y="0"/>
+          <a:ext cx="0" cy="0"/>
+          <a:chOff x="0" y="0"/>
+          <a:chExt cx="0" cy="0"/>
+        </a:xfrm>
+      </p:grpSpPr>
+      <p:sp>
+        <p:nvSpPr>
+          <p:cNvPr id="5" name="Titel 1">
+            <a:extLst>
+              <a:ext uri="{FF2B5EF4-FFF2-40B4-BE49-F238E27FC236}">
+                <a16:creationId xmlns:a16="http://schemas.microsoft.com/office/drawing/2014/main" id="{C3EC70A2-E912-9E17-C391-9CDD4F7ED71E}"/>
+              </a:ext>
+            </a:extLst>
+          </p:cNvPr>
+          <p:cNvSpPr>
+            <a:spLocks noGrp="1"/>
+          </p:cNvSpPr>
+          <p:nvPr/>
+        </p:nvSpPr>
+        <p:spPr>
+          <a:xfrm>
+            <a:off x="2294077" y="76200"/>
+            <a:ext cx="6007873" cy="768350"/>
+          </a:xfrm>
+          <a:prstGeom prst="rect">
+            <a:avLst/>
+          </a:prstGeom>
+        </p:spPr>
+        <p:txBody>
+          <a:bodyPr vert="horz" lIns="91440" tIns="45720" rIns="91440" bIns="45720" rtlCol="0" anchor="t">
+            <a:normAutofit/>
+          </a:bodyPr>
+          <a:lstStyle>
+            <a:lvl1pPr algn="l" defTabSz="457200" rtl="0" eaLnBrk="1" latinLnBrk="0" hangingPunct="1">
+              <a:spcBef>
+                <a:spcPct val="0"/>
+              </a:spcBef>
+              <a:buNone/>
+              <a:defRPr sz="3600" kern="1200">
+                <a:solidFill>
+                  <a:schemeClr val="accent1"/>
+                </a:solidFill>
+                <a:latin typeface="+mj-lt"/>
+                <a:ea typeface="+mj-ea"/>
+                <a:cs typeface="+mj-cs"/>
+              </a:defRPr>
+            </a:lvl1pPr>
+            <a:lvl2pPr eaLnBrk="1" hangingPunct="1">
+              <a:defRPr>
+                <a:solidFill>
+                  <a:schemeClr val="tx2"/>
+                </a:solidFill>
+              </a:defRPr>
+            </a:lvl2pPr>
+            <a:lvl3pPr eaLnBrk="1" hangingPunct="1">
+              <a:defRPr>
+                <a:solidFill>
+                  <a:schemeClr val="tx2"/>
+                </a:solidFill>
+              </a:defRPr>
+            </a:lvl3pPr>
+            <a:lvl4pPr eaLnBrk="1" hangingPunct="1">
+              <a:defRPr>
+                <a:solidFill>
+                  <a:schemeClr val="tx2"/>
+                </a:solidFill>
+              </a:defRPr>
+            </a:lvl4pPr>
+            <a:lvl5pPr eaLnBrk="1" hangingPunct="1">
+              <a:defRPr>
+                <a:solidFill>
+                  <a:schemeClr val="tx2"/>
+                </a:solidFill>
+              </a:defRPr>
+            </a:lvl5pPr>
+            <a:lvl6pPr eaLnBrk="1" hangingPunct="1">
+              <a:defRPr>
+                <a:solidFill>
+                  <a:schemeClr val="tx2"/>
+                </a:solidFill>
+              </a:defRPr>
+            </a:lvl6pPr>
+            <a:lvl7pPr eaLnBrk="1" hangingPunct="1">
+              <a:defRPr>
+                <a:solidFill>
+                  <a:schemeClr val="tx2"/>
+                </a:solidFill>
+              </a:defRPr>
+            </a:lvl7pPr>
+            <a:lvl8pPr eaLnBrk="1" hangingPunct="1">
+              <a:defRPr>
+                <a:solidFill>
+                  <a:schemeClr val="tx2"/>
+                </a:solidFill>
+              </a:defRPr>
+            </a:lvl8pPr>
+            <a:lvl9pPr eaLnBrk="1" hangingPunct="1">
+              <a:defRPr>
+                <a:solidFill>
+                  <a:schemeClr val="tx2"/>
+                </a:solidFill>
+              </a:defRPr>
+            </a:lvl9pPr>
+          </a:lstStyle>
+          <a:p>
+            <a:pPr algn="ctr"/>
+            <a:r>
+              <a:rPr lang="en-US" dirty="0">
+                <a:solidFill>
+                  <a:schemeClr val="tx1"/>
+                </a:solidFill>
+                <a:ea typeface="+mj-lt"/>
+                <a:cs typeface="+mj-lt"/>
+              </a:rPr>
+              <a:t>colab.research.google.com</a:t>
+            </a:r>
+            <a:endParaRPr lang="nl-NL" dirty="0">
+              <a:solidFill>
+                <a:schemeClr val="tx1"/>
+              </a:solidFill>
+              <a:ea typeface="+mj-lt"/>
+              <a:cs typeface="+mj-lt"/>
+            </a:endParaRPr>
+          </a:p>
+        </p:txBody>
+      </p:sp>
+      <p:pic>
+        <p:nvPicPr>
+          <p:cNvPr id="7" name="Afbeelding 4" descr="Afbeelding met tekst&#10;&#10;Automatisch gegenereerde beschrijving">
+            <a:extLst>
+              <a:ext uri="{FF2B5EF4-FFF2-40B4-BE49-F238E27FC236}">
+                <a16:creationId xmlns:a16="http://schemas.microsoft.com/office/drawing/2014/main" id="{30A5CE3E-F9E0-FC17-083B-F876B89A61B6}"/>
+              </a:ext>
+            </a:extLst>
+          </p:cNvPr>
+          <p:cNvPicPr>
+            <a:picLocks noChangeAspect="1"/>
+          </p:cNvPicPr>
+          <p:nvPr/>
+        </p:nvPicPr>
+        <p:blipFill rotWithShape="1">
+          <a:blip r:embed="rId2"/>
+          <a:srcRect l="4756" t="2241" r="2828" b="46379"/>
+          <a:stretch/>
+        </p:blipFill>
+        <p:spPr>
+          <a:xfrm>
+            <a:off x="192506" y="657225"/>
+            <a:ext cx="6853110" cy="2837609"/>
+          </a:xfrm>
+          <a:prstGeom prst="rect">
+            <a:avLst/>
+          </a:prstGeom>
+        </p:spPr>
+      </p:pic>
+      <p:pic>
+        <p:nvPicPr>
+          <p:cNvPr id="6" name="Picture 19">
+            <a:extLst>
+              <a:ext uri="{FF2B5EF4-FFF2-40B4-BE49-F238E27FC236}">
+                <a16:creationId xmlns:a16="http://schemas.microsoft.com/office/drawing/2014/main" id="{677BFB20-C97B-820F-02BC-A16EC616D660}"/>
+              </a:ext>
+            </a:extLst>
+          </p:cNvPr>
+          <p:cNvPicPr>
+            <a:picLocks noChangeAspect="1"/>
+          </p:cNvPicPr>
+          <p:nvPr/>
+        </p:nvPicPr>
+        <p:blipFill>
+          <a:blip r:embed="rId3"/>
+          <a:stretch>
+            <a:fillRect/>
+          </a:stretch>
+        </p:blipFill>
+        <p:spPr>
+          <a:xfrm>
+            <a:off x="7943349" y="658955"/>
+            <a:ext cx="4217067" cy="4458248"/>
+          </a:xfrm>
+          <a:prstGeom prst="rect">
+            <a:avLst/>
+          </a:prstGeom>
+        </p:spPr>
+      </p:pic>
+      <p:sp>
+        <p:nvSpPr>
+          <p:cNvPr id="20" name="TextBox 19">
+            <a:extLst>
+              <a:ext uri="{FF2B5EF4-FFF2-40B4-BE49-F238E27FC236}">
+                <a16:creationId xmlns:a16="http://schemas.microsoft.com/office/drawing/2014/main" id="{6BE49B93-50BB-DC46-C64D-1E9B98DBAADB}"/>
+              </a:ext>
+            </a:extLst>
+          </p:cNvPr>
+          <p:cNvSpPr txBox="1"/>
+          <p:nvPr/>
+        </p:nvSpPr>
+        <p:spPr>
+          <a:xfrm>
+            <a:off x="591552" y="3368842"/>
+            <a:ext cx="6296525" cy="3477875"/>
+          </a:xfrm>
+          <a:prstGeom prst="rect">
+            <a:avLst/>
+          </a:prstGeom>
+          <a:noFill/>
+        </p:spPr>
+        <p:txBody>
+          <a:bodyPr rot="0" spcFirstLastPara="0" vertOverflow="overflow" horzOverflow="overflow" vert="horz" wrap="square" lIns="91440" tIns="45720" rIns="91440" bIns="45720" numCol="1" spcCol="0" rtlCol="0" fromWordArt="0" anchor="t" anchorCtr="0" forceAA="0" compatLnSpc="1">
+            <a:prstTxWarp prst="textNoShape">
+              <a:avLst/>
+            </a:prstTxWarp>
+            <a:spAutoFit/>
+          </a:bodyPr>
+          <a:lstStyle/>
+          <a:p>
+            <a:pPr marL="342900" indent="-342900">
+              <a:buAutoNum type="arabicPeriod"/>
+            </a:pPr>
+            <a:r>
+              <a:rPr lang="en-US" sz="2000" dirty="0"/>
+              <a:t>Ga </a:t>
+            </a:r>
+            <a:r>
+              <a:rPr lang="en-US" sz="2000" err="1"/>
+              <a:t>naar</a:t>
+            </a:r>
+            <a:r>
+              <a:rPr lang="en-US" sz="2000" dirty="0"/>
+              <a:t> colab.research.google.com</a:t>
+            </a:r>
+          </a:p>
+          <a:p>
+            <a:pPr marL="342900" indent="-342900">
+              <a:buAutoNum type="arabicPeriod"/>
+            </a:pPr>
+            <a:endParaRPr lang="en-US" sz="2000" dirty="0"/>
+          </a:p>
+          <a:p>
+            <a:pPr marL="342900" indent="-342900">
+              <a:buAutoNum type="arabicPeriod"/>
+            </a:pPr>
+            <a:r>
+              <a:rPr lang="en-US" sz="2000" dirty="0"/>
+              <a:t>Als je </a:t>
+            </a:r>
+            <a:r>
+              <a:rPr lang="en-US" sz="2000" err="1"/>
+              <a:t>niet</a:t>
+            </a:r>
+            <a:r>
+              <a:rPr lang="en-US" sz="2000" dirty="0"/>
+              <a:t> </a:t>
+            </a:r>
+            <a:r>
+              <a:rPr lang="en-US" sz="2000" err="1"/>
+              <a:t>linkerafbeelding</a:t>
+            </a:r>
+            <a:r>
+              <a:rPr lang="en-US" sz="2000" dirty="0"/>
+              <a:t> </a:t>
+            </a:r>
+            <a:r>
+              <a:rPr lang="en-US" sz="2000" err="1"/>
+              <a:t>hierboven</a:t>
+            </a:r>
+            <a:r>
+              <a:rPr lang="en-US" sz="2000" dirty="0"/>
+              <a:t> </a:t>
+            </a:r>
+            <a:r>
+              <a:rPr lang="en-US" sz="2000" err="1"/>
+              <a:t>ziet</a:t>
+            </a:r>
+            <a:r>
+              <a:rPr lang="en-US" sz="2000" dirty="0"/>
+              <a:t>, </a:t>
+            </a:r>
+            <a:r>
+              <a:rPr lang="en-US" sz="2000" err="1"/>
+              <a:t>volg</a:t>
+            </a:r>
+            <a:r>
+              <a:rPr lang="en-US" sz="2000" dirty="0"/>
+              <a:t> </a:t>
+            </a:r>
+            <a:r>
+              <a:rPr lang="en-US" sz="2000" err="1"/>
+              <a:t>rechterafbeelding</a:t>
+            </a:r>
+            <a:r>
+              <a:rPr lang="en-US" sz="2000" dirty="0"/>
+              <a:t> </a:t>
+            </a:r>
+          </a:p>
+          <a:p>
+            <a:r>
+              <a:rPr lang="en-US" sz="2000" dirty="0"/>
+              <a:t>    (</a:t>
+            </a:r>
+            <a:r>
+              <a:rPr lang="en-US" sz="2000" dirty="0" err="1"/>
+              <a:t>Bestand</a:t>
+            </a:r>
+            <a:r>
+              <a:rPr lang="en-US" sz="2000" dirty="0"/>
+              <a:t> -&gt; Notebook </a:t>
+            </a:r>
+            <a:r>
+              <a:rPr lang="en-US" sz="2000" dirty="0" err="1"/>
+              <a:t>uploaden</a:t>
+            </a:r>
+            <a:r>
+              <a:rPr lang="en-US" sz="2000" dirty="0"/>
+              <a:t>)</a:t>
+            </a:r>
+            <a:endParaRPr lang="en-US"/>
+          </a:p>
+          <a:p>
+            <a:pPr marL="342900" indent="-342900">
+              <a:buAutoNum type="arabicPeriod"/>
+            </a:pPr>
+            <a:endParaRPr lang="en-US" sz="2000" dirty="0"/>
+          </a:p>
+          <a:p>
+            <a:r>
+              <a:rPr lang="en-US" sz="2000" dirty="0"/>
+              <a:t>3.  Druk op 'Choose File' (</a:t>
+            </a:r>
+            <a:r>
+              <a:rPr lang="en-US" sz="2000" dirty="0" err="1"/>
+              <a:t>linkerafbeelding</a:t>
+            </a:r>
+            <a:r>
+              <a:rPr lang="en-US" sz="2000" dirty="0"/>
+              <a:t>) </a:t>
+            </a:r>
+          </a:p>
+          <a:p>
+            <a:r>
+              <a:rPr lang="en-US" sz="2000" dirty="0"/>
+              <a:t>     </a:t>
+            </a:r>
+            <a:r>
+              <a:rPr lang="en-US" sz="2000" err="1"/>
+              <a:t>en</a:t>
+            </a:r>
+            <a:r>
+              <a:rPr lang="en-US" sz="2000" dirty="0"/>
+              <a:t> </a:t>
+            </a:r>
+            <a:r>
+              <a:rPr lang="en-US" sz="2000" err="1"/>
+              <a:t>kies</a:t>
+            </a:r>
+            <a:r>
+              <a:rPr lang="en-US" sz="2000" dirty="0"/>
+              <a:t> '</a:t>
+            </a:r>
+            <a:r>
+              <a:rPr lang="en-US" sz="2000" dirty="0">
+                <a:ea typeface="+mn-lt"/>
+                <a:cs typeface="+mn-lt"/>
+              </a:rPr>
+              <a:t>Intro </a:t>
+            </a:r>
+            <a:r>
+              <a:rPr lang="en-US" sz="2000" err="1">
+                <a:ea typeface="+mn-lt"/>
+                <a:cs typeface="+mn-lt"/>
+              </a:rPr>
+              <a:t>Python.ipynb</a:t>
+            </a:r>
+            <a:r>
+              <a:rPr lang="en-US" sz="2000" dirty="0">
+                <a:ea typeface="+mn-lt"/>
+                <a:cs typeface="+mn-lt"/>
+              </a:rPr>
+              <a:t>'</a:t>
+            </a:r>
+            <a:endParaRPr lang="en-US" sz="2000" dirty="0"/>
+          </a:p>
+          <a:p>
+            <a:pPr marL="342900" indent="-342900">
+              <a:buAutoNum type="arabicPeriod"/>
+            </a:pPr>
+            <a:endParaRPr lang="en-US" sz="2000" dirty="0">
+              <a:ea typeface="+mn-lt"/>
+              <a:cs typeface="+mn-lt"/>
+            </a:endParaRPr>
+          </a:p>
+          <a:p>
+            <a:r>
+              <a:rPr lang="en-US" sz="2000" dirty="0">
+                <a:ea typeface="+mn-lt"/>
+                <a:cs typeface="+mn-lt"/>
+              </a:rPr>
+              <a:t>4.  Nu </a:t>
+            </a:r>
+            <a:r>
+              <a:rPr lang="en-US" sz="2000" dirty="0" err="1">
+                <a:ea typeface="+mn-lt"/>
+                <a:cs typeface="+mn-lt"/>
+              </a:rPr>
+              <a:t>heb</a:t>
+            </a:r>
+            <a:r>
+              <a:rPr lang="en-US" sz="2000" dirty="0">
+                <a:ea typeface="+mn-lt"/>
+                <a:cs typeface="+mn-lt"/>
+              </a:rPr>
+              <a:t> je de notebook </a:t>
+            </a:r>
+            <a:r>
+              <a:rPr lang="en-US" sz="2000" dirty="0" err="1">
+                <a:ea typeface="+mn-lt"/>
+                <a:cs typeface="+mn-lt"/>
+              </a:rPr>
+              <a:t>klaarstaan</a:t>
+            </a:r>
+            <a:r>
+              <a:rPr lang="en-US" sz="2000" dirty="0">
+                <a:ea typeface="+mn-lt"/>
+                <a:cs typeface="+mn-lt"/>
+              </a:rPr>
+              <a:t> </a:t>
+            </a:r>
+            <a:r>
+              <a:rPr lang="en-US" sz="2000" dirty="0" err="1">
+                <a:ea typeface="+mn-lt"/>
+                <a:cs typeface="+mn-lt"/>
+              </a:rPr>
+              <a:t>en</a:t>
+            </a:r>
+            <a:r>
+              <a:rPr lang="en-US" sz="2000" dirty="0">
+                <a:ea typeface="+mn-lt"/>
+                <a:cs typeface="+mn-lt"/>
+              </a:rPr>
+              <a:t> </a:t>
+            </a:r>
+            <a:r>
+              <a:rPr lang="en-US" sz="2000" dirty="0" err="1">
+                <a:ea typeface="+mn-lt"/>
+                <a:cs typeface="+mn-lt"/>
+              </a:rPr>
+              <a:t>kan</a:t>
+            </a:r>
+            <a:r>
+              <a:rPr lang="en-US" sz="2000" dirty="0">
+                <a:ea typeface="+mn-lt"/>
+                <a:cs typeface="+mn-lt"/>
+              </a:rPr>
+              <a:t> je </a:t>
+            </a:r>
+            <a:r>
+              <a:rPr lang="en-US" sz="2000" dirty="0" err="1">
+                <a:ea typeface="+mn-lt"/>
+                <a:cs typeface="+mn-lt"/>
+              </a:rPr>
+              <a:t>beginnen</a:t>
+            </a:r>
+            <a:r>
+              <a:rPr lang="en-US" sz="2000" dirty="0">
+                <a:ea typeface="+mn-lt"/>
+                <a:cs typeface="+mn-lt"/>
+              </a:rPr>
+              <a:t>!</a:t>
+            </a:r>
+          </a:p>
+        </p:txBody>
+      </p:sp>
+    </p:spTree>
+    <p:extLst>
+      <p:ext uri="{BB962C8B-B14F-4D97-AF65-F5344CB8AC3E}">
+        <p14:creationId xmlns:p14="http://schemas.microsoft.com/office/powerpoint/2010/main" val="607795465"/>
+      </p:ext>
+    </p:extLst>
+  </p:cSld>
+  <p:clrMapOvr>
+    <a:masterClrMapping/>
+  </p:clrMapOvr>
+</p:sld>
+</file>
+
+<file path=ppt/slides/slide22.xml><?xml version="1.0" encoding="utf-8"?>
 <p:sld xmlns:a="http://schemas.openxmlformats.org/drawingml/2006/main" xmlns:r="http://schemas.openxmlformats.org/officeDocument/2006/relationships" xmlns:p="http://schemas.openxmlformats.org/presentationml/2006/main">
   <p:cSld>
     <p:spTree>
@@ -11818,6 +11874,124 @@
           </a:prstGeom>
         </p:spPr>
       </p:pic>
+      <p:cxnSp>
+        <p:nvCxnSpPr>
+          <p:cNvPr id="5" name="Straight Arrow Connector 4">
+            <a:extLst>
+              <a:ext uri="{FF2B5EF4-FFF2-40B4-BE49-F238E27FC236}">
+                <a16:creationId xmlns:a16="http://schemas.microsoft.com/office/drawing/2014/main" id="{70112D33-7106-DE0A-86FE-0878BB4B5D57}"/>
+              </a:ext>
+            </a:extLst>
+          </p:cNvPr>
+          <p:cNvCxnSpPr/>
+          <p:nvPr/>
+        </p:nvCxnSpPr>
+        <p:spPr>
+          <a:xfrm flipH="1" flipV="1">
+            <a:off x="690312" y="4209550"/>
+            <a:ext cx="188495" cy="1231231"/>
+          </a:xfrm>
+          <a:prstGeom prst="straightConnector1">
+            <a:avLst/>
+          </a:prstGeom>
+          <a:ln w="57150">
+            <a:tailEnd type="triangle"/>
+          </a:ln>
+        </p:spPr>
+        <p:style>
+          <a:lnRef idx="1">
+            <a:schemeClr val="accent1"/>
+          </a:lnRef>
+          <a:fillRef idx="0">
+            <a:schemeClr val="accent1"/>
+          </a:fillRef>
+          <a:effectRef idx="0">
+            <a:schemeClr val="accent1"/>
+          </a:effectRef>
+          <a:fontRef idx="minor">
+            <a:schemeClr val="tx1"/>
+          </a:fontRef>
+        </p:style>
+      </p:cxnSp>
+      <p:sp>
+        <p:nvSpPr>
+          <p:cNvPr id="6" name="TextBox 5">
+            <a:extLst>
+              <a:ext uri="{FF2B5EF4-FFF2-40B4-BE49-F238E27FC236}">
+                <a16:creationId xmlns:a16="http://schemas.microsoft.com/office/drawing/2014/main" id="{CB2363D5-9831-E9D3-E383-2AC93E2C61FA}"/>
+              </a:ext>
+            </a:extLst>
+          </p:cNvPr>
+          <p:cNvSpPr txBox="1"/>
+          <p:nvPr/>
+        </p:nvSpPr>
+        <p:spPr>
+          <a:xfrm>
+            <a:off x="681789" y="5684920"/>
+            <a:ext cx="4441657" cy="707886"/>
+          </a:xfrm>
+          <a:prstGeom prst="rect">
+            <a:avLst/>
+          </a:prstGeom>
+          <a:noFill/>
+        </p:spPr>
+        <p:txBody>
+          <a:bodyPr rot="0" spcFirstLastPara="0" vertOverflow="overflow" horzOverflow="overflow" vert="horz" wrap="square" lIns="91440" tIns="45720" rIns="91440" bIns="45720" numCol="1" spcCol="0" rtlCol="0" fromWordArt="0" anchor="t" anchorCtr="0" forceAA="0" compatLnSpc="1">
+            <a:prstTxWarp prst="textNoShape">
+              <a:avLst/>
+            </a:prstTxWarp>
+            <a:spAutoFit/>
+          </a:bodyPr>
+          <a:lstStyle/>
+          <a:p>
+            <a:r>
+              <a:rPr lang="en-US" sz="2000" err="1"/>
+              <a:t>Voer</a:t>
+            </a:r>
+            <a:r>
+              <a:rPr lang="en-US" sz="2000" dirty="0"/>
+              <a:t> </a:t>
+            </a:r>
+            <a:r>
+              <a:rPr lang="en-US" sz="2000" err="1"/>
+              <a:t>stukjes</a:t>
+            </a:r>
+            <a:r>
+              <a:rPr lang="en-US" sz="2000" dirty="0"/>
+              <a:t> Python code </a:t>
+            </a:r>
+            <a:r>
+              <a:rPr lang="en-US" sz="2000" err="1"/>
+              <a:t>uit</a:t>
+            </a:r>
+            <a:r>
+              <a:rPr lang="en-US" sz="2000" dirty="0"/>
+              <a:t> door ronde, </a:t>
+            </a:r>
+            <a:r>
+              <a:rPr lang="en-US" sz="2000" err="1"/>
+              <a:t>zwarte</a:t>
+            </a:r>
+            <a:r>
+              <a:rPr lang="en-US" sz="2000" dirty="0"/>
+              <a:t> knop </a:t>
+            </a:r>
+            <a:r>
+              <a:rPr lang="en-US" sz="2000" err="1"/>
+              <a:t>te</a:t>
+            </a:r>
+            <a:r>
+              <a:rPr lang="en-US" sz="2000" dirty="0"/>
+              <a:t> </a:t>
+            </a:r>
+            <a:r>
+              <a:rPr lang="en-US" sz="2000" err="1"/>
+              <a:t>klikken</a:t>
+            </a:r>
+            <a:endParaRPr lang="en-US" sz="2000"/>
+          </a:p>
+        </p:txBody>
+      </p:sp>
     </p:spTree>
     <p:extLst>
       <p:ext uri="{BB962C8B-B14F-4D97-AF65-F5344CB8AC3E}">
@@ -11831,7 +12005,7 @@
 </p:sld>
 </file>
 
-<file path=ppt/slides/slide22.xml><?xml version="1.0" encoding="utf-8"?>
+<file path=ppt/slides/slide23.xml><?xml version="1.0" encoding="utf-8"?>
 <p:sld xmlns:a="http://schemas.openxmlformats.org/drawingml/2006/main" xmlns:r="http://schemas.openxmlformats.org/officeDocument/2006/relationships" xmlns:p="http://schemas.openxmlformats.org/presentationml/2006/main">
   <p:cSld>
     <p:spTree>
@@ -11896,7 +12070,7 @@
 </p:sld>
 </file>
 
-<file path=ppt/slides/slide23.xml><?xml version="1.0" encoding="utf-8"?>
+<file path=ppt/slides/slide24.xml><?xml version="1.0" encoding="utf-8"?>
 <p:sld xmlns:a="http://schemas.openxmlformats.org/drawingml/2006/main" xmlns:r="http://schemas.openxmlformats.org/officeDocument/2006/relationships" xmlns:p="http://schemas.openxmlformats.org/presentationml/2006/main">
   <p:cSld>
     <p:spTree>
@@ -11962,7 +12136,7 @@
 </p:sld>
 </file>
 
-<file path=ppt/slides/slide24.xml><?xml version="1.0" encoding="utf-8"?>
+<file path=ppt/slides/slide25.xml><?xml version="1.0" encoding="utf-8"?>
 <p:sld xmlns:a="http://schemas.openxmlformats.org/drawingml/2006/main" xmlns:r="http://schemas.openxmlformats.org/officeDocument/2006/relationships" xmlns:p="http://schemas.openxmlformats.org/presentationml/2006/main">
   <p:cSld>
     <p:spTree>
@@ -12130,7 +12304,7 @@
 </p:sld>
 </file>
 
-<file path=ppt/slides/slide25.xml><?xml version="1.0" encoding="utf-8"?>
+<file path=ppt/slides/slide26.xml><?xml version="1.0" encoding="utf-8"?>
 <p:sld xmlns:a="http://schemas.openxmlformats.org/drawingml/2006/main" xmlns:r="http://schemas.openxmlformats.org/officeDocument/2006/relationships" xmlns:p="http://schemas.openxmlformats.org/presentationml/2006/main">
   <p:cSld>
     <p:spTree>
@@ -12297,7 +12471,7 @@
 </p:sld>
 </file>
 
-<file path=ppt/slides/slide26.xml><?xml version="1.0" encoding="utf-8"?>
+<file path=ppt/slides/slide27.xml><?xml version="1.0" encoding="utf-8"?>
 <p:sld xmlns:a="http://schemas.openxmlformats.org/drawingml/2006/main" xmlns:r="http://schemas.openxmlformats.org/officeDocument/2006/relationships" xmlns:p="http://schemas.openxmlformats.org/presentationml/2006/main">
   <p:cSld>
     <p:spTree>
@@ -12386,7 +12560,7 @@
 </p:sld>
 </file>
 
-<file path=ppt/slides/slide27.xml><?xml version="1.0" encoding="utf-8"?>
+<file path=ppt/slides/slide28.xml><?xml version="1.0" encoding="utf-8"?>
 <p:sld xmlns:a="http://schemas.openxmlformats.org/drawingml/2006/main" xmlns:r="http://schemas.openxmlformats.org/officeDocument/2006/relationships" xmlns:p="http://schemas.openxmlformats.org/presentationml/2006/main">
   <p:cSld>
     <p:spTree>
@@ -12506,7 +12680,7 @@
 </p:sld>
 </file>
 
-<file path=ppt/slides/slide28.xml><?xml version="1.0" encoding="utf-8"?>
+<file path=ppt/slides/slide29.xml><?xml version="1.0" encoding="utf-8"?>
 <p:sld xmlns:a="http://schemas.openxmlformats.org/drawingml/2006/main" xmlns:r="http://schemas.openxmlformats.org/officeDocument/2006/relationships" xmlns:p="http://schemas.openxmlformats.org/presentationml/2006/main">
   <p:cSld>
     <p:spTree>
@@ -12913,7 +13087,196 @@
 </p:sld>
 </file>
 
-<file path=ppt/slides/slide29.xml><?xml version="1.0" encoding="utf-8"?>
+<file path=ppt/slides/slide3.xml><?xml version="1.0" encoding="utf-8"?>
+<p:sld xmlns:a="http://schemas.openxmlformats.org/drawingml/2006/main" xmlns:r="http://schemas.openxmlformats.org/officeDocument/2006/relationships" xmlns:p="http://schemas.openxmlformats.org/presentationml/2006/main">
+  <p:cSld>
+    <p:spTree>
+      <p:nvGrpSpPr>
+        <p:cNvPr id="1" name=""/>
+        <p:cNvGrpSpPr/>
+        <p:nvPr/>
+      </p:nvGrpSpPr>
+      <p:grpSpPr>
+        <a:xfrm>
+          <a:off x="0" y="0"/>
+          <a:ext cx="0" cy="0"/>
+          <a:chOff x="0" y="0"/>
+          <a:chExt cx="0" cy="0"/>
+        </a:xfrm>
+      </p:grpSpPr>
+      <p:pic>
+        <p:nvPicPr>
+          <p:cNvPr id="1028" name="Picture 4" descr="The Python Logo | Python Software Foundation"/>
+          <p:cNvPicPr>
+            <a:picLocks noChangeAspect="1" noChangeArrowheads="1"/>
+          </p:cNvPicPr>
+          <p:nvPr/>
+        </p:nvPicPr>
+        <p:blipFill>
+          <a:blip r:embed="rId2">
+            <a:extLst>
+              <a:ext uri="{28A0092B-C50C-407E-A947-70E740481C1C}">
+                <a14:useLocalDpi xmlns:a14="http://schemas.microsoft.com/office/drawing/2010/main" val="0"/>
+              </a:ext>
+            </a:extLst>
+          </a:blip>
+          <a:srcRect/>
+          <a:stretch>
+            <a:fillRect/>
+          </a:stretch>
+        </p:blipFill>
+        <p:spPr bwMode="auto">
+          <a:xfrm>
+            <a:off x="3173095" y="948026"/>
+            <a:ext cx="5724525" cy="1933576"/>
+          </a:xfrm>
+          <a:prstGeom prst="rect">
+            <a:avLst/>
+          </a:prstGeom>
+          <a:noFill/>
+          <a:extLst>
+            <a:ext uri="{909E8E84-426E-40DD-AFC4-6F175D3DCCD1}">
+              <a14:hiddenFill xmlns:a14="http://schemas.microsoft.com/office/drawing/2010/main">
+                <a:solidFill>
+                  <a:srgbClr val="FFFFFF"/>
+                </a:solidFill>
+              </a14:hiddenFill>
+            </a:ext>
+          </a:extLst>
+        </p:spPr>
+      </p:pic>
+      <p:pic>
+        <p:nvPicPr>
+          <p:cNvPr id="1036" name="Picture 12" descr="Posts tagged as &quot;Pandas&quot; | Ashish Thanki Blog"/>
+          <p:cNvPicPr>
+            <a:picLocks noChangeAspect="1" noChangeArrowheads="1"/>
+          </p:cNvPicPr>
+          <p:nvPr/>
+        </p:nvPicPr>
+        <p:blipFill>
+          <a:blip r:embed="rId3">
+            <a:extLst>
+              <a:ext uri="{28A0092B-C50C-407E-A947-70E740481C1C}">
+                <a14:useLocalDpi xmlns:a14="http://schemas.microsoft.com/office/drawing/2010/main" val="0"/>
+              </a:ext>
+            </a:extLst>
+          </a:blip>
+          <a:srcRect/>
+          <a:stretch>
+            <a:fillRect/>
+          </a:stretch>
+        </p:blipFill>
+        <p:spPr bwMode="auto">
+          <a:xfrm>
+            <a:off x="3420214" y="3097787"/>
+            <a:ext cx="2804864" cy="1172095"/>
+          </a:xfrm>
+          <a:prstGeom prst="rect">
+            <a:avLst/>
+          </a:prstGeom>
+          <a:noFill/>
+          <a:extLst>
+            <a:ext uri="{909E8E84-426E-40DD-AFC4-6F175D3DCCD1}">
+              <a14:hiddenFill xmlns:a14="http://schemas.microsoft.com/office/drawing/2010/main">
+                <a:solidFill>
+                  <a:srgbClr val="FFFFFF"/>
+                </a:solidFill>
+              </a14:hiddenFill>
+            </a:ext>
+          </a:extLst>
+        </p:spPr>
+      </p:pic>
+      <p:pic>
+        <p:nvPicPr>
+          <p:cNvPr id="1038" name="Picture 14" descr="The Data Science Trilogy. So you are new to Python. Or perhaps… | by Hair  Parra | Towards Data Science"/>
+          <p:cNvPicPr>
+            <a:picLocks noChangeAspect="1" noChangeArrowheads="1"/>
+          </p:cNvPicPr>
+          <p:nvPr/>
+        </p:nvPicPr>
+        <p:blipFill>
+          <a:blip r:embed="rId4" cstate="print">
+            <a:extLst>
+              <a:ext uri="{28A0092B-C50C-407E-A947-70E740481C1C}">
+                <a14:useLocalDpi xmlns:a14="http://schemas.microsoft.com/office/drawing/2010/main" val="0"/>
+              </a:ext>
+            </a:extLst>
+          </a:blip>
+          <a:srcRect/>
+          <a:stretch>
+            <a:fillRect/>
+          </a:stretch>
+        </p:blipFill>
+        <p:spPr bwMode="auto">
+          <a:xfrm>
+            <a:off x="7439572" y="3027714"/>
+            <a:ext cx="2916095" cy="1312243"/>
+          </a:xfrm>
+          <a:prstGeom prst="rect">
+            <a:avLst/>
+          </a:prstGeom>
+          <a:noFill/>
+          <a:extLst>
+            <a:ext uri="{909E8E84-426E-40DD-AFC4-6F175D3DCCD1}">
+              <a14:hiddenFill xmlns:a14="http://schemas.microsoft.com/office/drawing/2010/main">
+                <a:solidFill>
+                  <a:srgbClr val="FFFFFF"/>
+                </a:solidFill>
+              </a14:hiddenFill>
+            </a:ext>
+          </a:extLst>
+        </p:spPr>
+      </p:pic>
+      <p:pic>
+        <p:nvPicPr>
+          <p:cNvPr id="1040" name="Picture 16" descr="SKLearn | Scikit-Learn In Python | SciKit Learn Tutorial"/>
+          <p:cNvPicPr>
+            <a:picLocks noChangeAspect="1" noChangeArrowheads="1"/>
+          </p:cNvPicPr>
+          <p:nvPr/>
+        </p:nvPicPr>
+        <p:blipFill>
+          <a:blip r:embed="rId5">
+            <a:extLst>
+              <a:ext uri="{28A0092B-C50C-407E-A947-70E740481C1C}">
+                <a14:useLocalDpi xmlns:a14="http://schemas.microsoft.com/office/drawing/2010/main" val="0"/>
+              </a:ext>
+            </a:extLst>
+          </a:blip>
+          <a:srcRect/>
+          <a:stretch>
+            <a:fillRect/>
+          </a:stretch>
+        </p:blipFill>
+        <p:spPr bwMode="auto">
+          <a:xfrm>
+            <a:off x="4195559" y="4495596"/>
+            <a:ext cx="5391150" cy="1924051"/>
+          </a:xfrm>
+          <a:prstGeom prst="rect">
+            <a:avLst/>
+          </a:prstGeom>
+          <a:noFill/>
+          <a:extLst>
+            <a:ext uri="{909E8E84-426E-40DD-AFC4-6F175D3DCCD1}">
+              <a14:hiddenFill xmlns:a14="http://schemas.microsoft.com/office/drawing/2010/main">
+                <a:solidFill>
+                  <a:srgbClr val="FFFFFF"/>
+                </a:solidFill>
+              </a14:hiddenFill>
+            </a:ext>
+          </a:extLst>
+        </p:spPr>
+      </p:pic>
+    </p:spTree>
+  </p:cSld>
+  <p:clrMapOvr>
+    <a:masterClrMapping/>
+  </p:clrMapOvr>
+</p:sld>
+</file>
+
+<file path=ppt/slides/slide30.xml><?xml version="1.0" encoding="utf-8"?>
 <p:sld xmlns:a="http://schemas.openxmlformats.org/drawingml/2006/main" xmlns:r="http://schemas.openxmlformats.org/officeDocument/2006/relationships" xmlns:p="http://schemas.openxmlformats.org/presentationml/2006/main">
   <p:cSld>
     <p:spTree>
@@ -14078,196 +14441,7 @@
 </p:sld>
 </file>
 
-<file path=ppt/slides/slide3.xml><?xml version="1.0" encoding="utf-8"?>
-<p:sld xmlns:a="http://schemas.openxmlformats.org/drawingml/2006/main" xmlns:r="http://schemas.openxmlformats.org/officeDocument/2006/relationships" xmlns:p="http://schemas.openxmlformats.org/presentationml/2006/main">
-  <p:cSld>
-    <p:spTree>
-      <p:nvGrpSpPr>
-        <p:cNvPr id="1" name=""/>
-        <p:cNvGrpSpPr/>
-        <p:nvPr/>
-      </p:nvGrpSpPr>
-      <p:grpSpPr>
-        <a:xfrm>
-          <a:off x="0" y="0"/>
-          <a:ext cx="0" cy="0"/>
-          <a:chOff x="0" y="0"/>
-          <a:chExt cx="0" cy="0"/>
-        </a:xfrm>
-      </p:grpSpPr>
-      <p:pic>
-        <p:nvPicPr>
-          <p:cNvPr id="1028" name="Picture 4" descr="The Python Logo | Python Software Foundation"/>
-          <p:cNvPicPr>
-            <a:picLocks noChangeAspect="1" noChangeArrowheads="1"/>
-          </p:cNvPicPr>
-          <p:nvPr/>
-        </p:nvPicPr>
-        <p:blipFill>
-          <a:blip r:embed="rId2">
-            <a:extLst>
-              <a:ext uri="{28A0092B-C50C-407E-A947-70E740481C1C}">
-                <a14:useLocalDpi xmlns:a14="http://schemas.microsoft.com/office/drawing/2010/main" val="0"/>
-              </a:ext>
-            </a:extLst>
-          </a:blip>
-          <a:srcRect/>
-          <a:stretch>
-            <a:fillRect/>
-          </a:stretch>
-        </p:blipFill>
-        <p:spPr bwMode="auto">
-          <a:xfrm>
-            <a:off x="3173095" y="948026"/>
-            <a:ext cx="5724525" cy="1933576"/>
-          </a:xfrm>
-          <a:prstGeom prst="rect">
-            <a:avLst/>
-          </a:prstGeom>
-          <a:noFill/>
-          <a:extLst>
-            <a:ext uri="{909E8E84-426E-40DD-AFC4-6F175D3DCCD1}">
-              <a14:hiddenFill xmlns:a14="http://schemas.microsoft.com/office/drawing/2010/main">
-                <a:solidFill>
-                  <a:srgbClr val="FFFFFF"/>
-                </a:solidFill>
-              </a14:hiddenFill>
-            </a:ext>
-          </a:extLst>
-        </p:spPr>
-      </p:pic>
-      <p:pic>
-        <p:nvPicPr>
-          <p:cNvPr id="1036" name="Picture 12" descr="Posts tagged as &quot;Pandas&quot; | Ashish Thanki Blog"/>
-          <p:cNvPicPr>
-            <a:picLocks noChangeAspect="1" noChangeArrowheads="1"/>
-          </p:cNvPicPr>
-          <p:nvPr/>
-        </p:nvPicPr>
-        <p:blipFill>
-          <a:blip r:embed="rId3">
-            <a:extLst>
-              <a:ext uri="{28A0092B-C50C-407E-A947-70E740481C1C}">
-                <a14:useLocalDpi xmlns:a14="http://schemas.microsoft.com/office/drawing/2010/main" val="0"/>
-              </a:ext>
-            </a:extLst>
-          </a:blip>
-          <a:srcRect/>
-          <a:stretch>
-            <a:fillRect/>
-          </a:stretch>
-        </p:blipFill>
-        <p:spPr bwMode="auto">
-          <a:xfrm>
-            <a:off x="3420214" y="3097787"/>
-            <a:ext cx="2804864" cy="1172095"/>
-          </a:xfrm>
-          <a:prstGeom prst="rect">
-            <a:avLst/>
-          </a:prstGeom>
-          <a:noFill/>
-          <a:extLst>
-            <a:ext uri="{909E8E84-426E-40DD-AFC4-6F175D3DCCD1}">
-              <a14:hiddenFill xmlns:a14="http://schemas.microsoft.com/office/drawing/2010/main">
-                <a:solidFill>
-                  <a:srgbClr val="FFFFFF"/>
-                </a:solidFill>
-              </a14:hiddenFill>
-            </a:ext>
-          </a:extLst>
-        </p:spPr>
-      </p:pic>
-      <p:pic>
-        <p:nvPicPr>
-          <p:cNvPr id="1038" name="Picture 14" descr="The Data Science Trilogy. So you are new to Python. Or perhaps… | by Hair  Parra | Towards Data Science"/>
-          <p:cNvPicPr>
-            <a:picLocks noChangeAspect="1" noChangeArrowheads="1"/>
-          </p:cNvPicPr>
-          <p:nvPr/>
-        </p:nvPicPr>
-        <p:blipFill>
-          <a:blip r:embed="rId4" cstate="print">
-            <a:extLst>
-              <a:ext uri="{28A0092B-C50C-407E-A947-70E740481C1C}">
-                <a14:useLocalDpi xmlns:a14="http://schemas.microsoft.com/office/drawing/2010/main" val="0"/>
-              </a:ext>
-            </a:extLst>
-          </a:blip>
-          <a:srcRect/>
-          <a:stretch>
-            <a:fillRect/>
-          </a:stretch>
-        </p:blipFill>
-        <p:spPr bwMode="auto">
-          <a:xfrm>
-            <a:off x="7439572" y="3027714"/>
-            <a:ext cx="2916095" cy="1312243"/>
-          </a:xfrm>
-          <a:prstGeom prst="rect">
-            <a:avLst/>
-          </a:prstGeom>
-          <a:noFill/>
-          <a:extLst>
-            <a:ext uri="{909E8E84-426E-40DD-AFC4-6F175D3DCCD1}">
-              <a14:hiddenFill xmlns:a14="http://schemas.microsoft.com/office/drawing/2010/main">
-                <a:solidFill>
-                  <a:srgbClr val="FFFFFF"/>
-                </a:solidFill>
-              </a14:hiddenFill>
-            </a:ext>
-          </a:extLst>
-        </p:spPr>
-      </p:pic>
-      <p:pic>
-        <p:nvPicPr>
-          <p:cNvPr id="1040" name="Picture 16" descr="SKLearn | Scikit-Learn In Python | SciKit Learn Tutorial"/>
-          <p:cNvPicPr>
-            <a:picLocks noChangeAspect="1" noChangeArrowheads="1"/>
-          </p:cNvPicPr>
-          <p:nvPr/>
-        </p:nvPicPr>
-        <p:blipFill>
-          <a:blip r:embed="rId5">
-            <a:extLst>
-              <a:ext uri="{28A0092B-C50C-407E-A947-70E740481C1C}">
-                <a14:useLocalDpi xmlns:a14="http://schemas.microsoft.com/office/drawing/2010/main" val="0"/>
-              </a:ext>
-            </a:extLst>
-          </a:blip>
-          <a:srcRect/>
-          <a:stretch>
-            <a:fillRect/>
-          </a:stretch>
-        </p:blipFill>
-        <p:spPr bwMode="auto">
-          <a:xfrm>
-            <a:off x="4195559" y="4495596"/>
-            <a:ext cx="5391150" cy="1924051"/>
-          </a:xfrm>
-          <a:prstGeom prst="rect">
-            <a:avLst/>
-          </a:prstGeom>
-          <a:noFill/>
-          <a:extLst>
-            <a:ext uri="{909E8E84-426E-40DD-AFC4-6F175D3DCCD1}">
-              <a14:hiddenFill xmlns:a14="http://schemas.microsoft.com/office/drawing/2010/main">
-                <a:solidFill>
-                  <a:srgbClr val="FFFFFF"/>
-                </a:solidFill>
-              </a14:hiddenFill>
-            </a:ext>
-          </a:extLst>
-        </p:spPr>
-      </p:pic>
-    </p:spTree>
-  </p:cSld>
-  <p:clrMapOvr>
-    <a:masterClrMapping/>
-  </p:clrMapOvr>
-</p:sld>
-</file>
-
-<file path=ppt/slides/slide30.xml><?xml version="1.0" encoding="utf-8"?>
+<file path=ppt/slides/slide31.xml><?xml version="1.0" encoding="utf-8"?>
 <p:sld xmlns:a="http://schemas.openxmlformats.org/drawingml/2006/main" xmlns:r="http://schemas.openxmlformats.org/officeDocument/2006/relationships" xmlns:p="http://schemas.openxmlformats.org/presentationml/2006/main">
   <p:cSld>
     <p:spTree>
@@ -15072,7 +15246,7 @@
 </p:sld>
 </file>
 
-<file path=ppt/slides/slide31.xml><?xml version="1.0" encoding="utf-8"?>
+<file path=ppt/slides/slide32.xml><?xml version="1.0" encoding="utf-8"?>
 <p:sld xmlns:a="http://schemas.openxmlformats.org/drawingml/2006/main" xmlns:r="http://schemas.openxmlformats.org/officeDocument/2006/relationships" xmlns:p="http://schemas.openxmlformats.org/presentationml/2006/main">
   <p:cSld>
     <p:spTree>
@@ -15326,7 +15500,7 @@
 </p:sld>
 </file>
 
-<file path=ppt/slides/slide32.xml><?xml version="1.0" encoding="utf-8"?>
+<file path=ppt/slides/slide33.xml><?xml version="1.0" encoding="utf-8"?>
 <p:sld xmlns:a="http://schemas.openxmlformats.org/drawingml/2006/main" xmlns:r="http://schemas.openxmlformats.org/officeDocument/2006/relationships" xmlns:p="http://schemas.openxmlformats.org/presentationml/2006/main">
   <p:cSld>
     <p:spTree>
@@ -15409,7 +15583,7 @@
 </p:sld>
 </file>
 
-<file path=ppt/slides/slide33.xml><?xml version="1.0" encoding="utf-8"?>
+<file path=ppt/slides/slide34.xml><?xml version="1.0" encoding="utf-8"?>
 <p:sld xmlns:a="http://schemas.openxmlformats.org/drawingml/2006/main" xmlns:r="http://schemas.openxmlformats.org/officeDocument/2006/relationships" xmlns:p="http://schemas.openxmlformats.org/presentationml/2006/main">
   <p:cSld>
     <p:spTree>
@@ -15458,7 +15632,7 @@
 </p:sld>
 </file>
 
-<file path=ppt/slides/slide34.xml><?xml version="1.0" encoding="utf-8"?>
+<file path=ppt/slides/slide35.xml><?xml version="1.0" encoding="utf-8"?>
 <p:sld xmlns:a="http://schemas.openxmlformats.org/drawingml/2006/main" xmlns:r="http://schemas.openxmlformats.org/officeDocument/2006/relationships" xmlns:p="http://schemas.openxmlformats.org/presentationml/2006/main">
   <p:cSld>
     <p:spTree>
@@ -15507,7 +15681,7 @@
 </p:sld>
 </file>
 
-<file path=ppt/slides/slide35.xml><?xml version="1.0" encoding="utf-8"?>
+<file path=ppt/slides/slide36.xml><?xml version="1.0" encoding="utf-8"?>
 <p:sld xmlns:a="http://schemas.openxmlformats.org/drawingml/2006/main" xmlns:r="http://schemas.openxmlformats.org/officeDocument/2006/relationships" xmlns:p="http://schemas.openxmlformats.org/presentationml/2006/main">
   <p:cSld>
     <p:spTree>
@@ -15587,7 +15761,7 @@
 </p:sld>
 </file>
 
-<file path=ppt/slides/slide36.xml><?xml version="1.0" encoding="utf-8"?>
+<file path=ppt/slides/slide37.xml><?xml version="1.0" encoding="utf-8"?>
 <p:sld xmlns:a="http://schemas.openxmlformats.org/drawingml/2006/main" xmlns:r="http://schemas.openxmlformats.org/officeDocument/2006/relationships" xmlns:p="http://schemas.openxmlformats.org/presentationml/2006/main">
   <p:cSld>
     <p:spTree>
@@ -15742,7 +15916,7 @@
 </p:sld>
 </file>
 
-<file path=ppt/slides/slide37.xml><?xml version="1.0" encoding="utf-8"?>
+<file path=ppt/slides/slide38.xml><?xml version="1.0" encoding="utf-8"?>
 <p:sld xmlns:a="http://schemas.openxmlformats.org/drawingml/2006/main" xmlns:r="http://schemas.openxmlformats.org/officeDocument/2006/relationships" xmlns:p="http://schemas.openxmlformats.org/presentationml/2006/main">
   <p:cSld>
     <p:spTree>
@@ -15791,7 +15965,7 @@
 </p:sld>
 </file>
 
-<file path=ppt/slides/slide38.xml><?xml version="1.0" encoding="utf-8"?>
+<file path=ppt/slides/slide39.xml><?xml version="1.0" encoding="utf-8"?>
 <p:sld xmlns:a="http://schemas.openxmlformats.org/drawingml/2006/main" xmlns:r="http://schemas.openxmlformats.org/officeDocument/2006/relationships" xmlns:p="http://schemas.openxmlformats.org/presentationml/2006/main">
   <p:cSld>
     <p:spTree>
@@ -15857,79 +16031,6 @@
           <a:xfrm>
             <a:off x="486207" y="1202488"/>
             <a:ext cx="8670638" cy="4283912"/>
-          </a:xfrm>
-          <a:prstGeom prst="rect">
-            <a:avLst/>
-          </a:prstGeom>
-        </p:spPr>
-      </p:pic>
-    </p:spTree>
-  </p:cSld>
-  <p:clrMapOvr>
-    <a:masterClrMapping/>
-  </p:clrMapOvr>
-</p:sld>
-</file>
-
-<file path=ppt/slides/slide39.xml><?xml version="1.0" encoding="utf-8"?>
-<p:sld xmlns:a="http://schemas.openxmlformats.org/drawingml/2006/main" xmlns:r="http://schemas.openxmlformats.org/officeDocument/2006/relationships" xmlns:p="http://schemas.openxmlformats.org/presentationml/2006/main">
-  <p:cSld>
-    <p:spTree>
-      <p:nvGrpSpPr>
-        <p:cNvPr id="1" name=""/>
-        <p:cNvGrpSpPr/>
-        <p:nvPr/>
-      </p:nvGrpSpPr>
-      <p:grpSpPr>
-        <a:xfrm>
-          <a:off x="0" y="0"/>
-          <a:ext cx="0" cy="0"/>
-          <a:chOff x="0" y="0"/>
-          <a:chExt cx="0" cy="0"/>
-        </a:xfrm>
-      </p:grpSpPr>
-      <p:sp>
-        <p:nvSpPr>
-          <p:cNvPr id="2" name="Titel 1"/>
-          <p:cNvSpPr>
-            <a:spLocks noGrp="1"/>
-          </p:cNvSpPr>
-          <p:nvPr>
-            <p:ph type="title"/>
-          </p:nvPr>
-        </p:nvSpPr>
-        <p:spPr/>
-        <p:txBody>
-          <a:bodyPr/>
-          <a:lstStyle/>
-          <a:p>
-            <a:pPr algn="ctr"/>
-            <a:r>
-              <a:rPr lang="nl-NL" dirty="0" err="1"/>
-              <a:t>seaborn</a:t>
-            </a:r>
-            <a:endParaRPr lang="nl-NL" dirty="0"/>
-          </a:p>
-        </p:txBody>
-      </p:sp>
-      <p:pic>
-        <p:nvPicPr>
-          <p:cNvPr id="5" name="Afbeelding 4"/>
-          <p:cNvPicPr>
-            <a:picLocks noChangeAspect="1"/>
-          </p:cNvPicPr>
-          <p:nvPr/>
-        </p:nvPicPr>
-        <p:blipFill>
-          <a:blip r:embed="rId2"/>
-          <a:stretch>
-            <a:fillRect/>
-          </a:stretch>
-        </p:blipFill>
-        <p:spPr>
-          <a:xfrm>
-            <a:off x="1093037" y="1681162"/>
-            <a:ext cx="7229475" cy="4410075"/>
           </a:xfrm>
           <a:prstGeom prst="rect">
             <a:avLst/>
@@ -16093,6 +16194,79 @@
 </file>
 
 <file path=ppt/slides/slide40.xml><?xml version="1.0" encoding="utf-8"?>
+<p:sld xmlns:a="http://schemas.openxmlformats.org/drawingml/2006/main" xmlns:r="http://schemas.openxmlformats.org/officeDocument/2006/relationships" xmlns:p="http://schemas.openxmlformats.org/presentationml/2006/main">
+  <p:cSld>
+    <p:spTree>
+      <p:nvGrpSpPr>
+        <p:cNvPr id="1" name=""/>
+        <p:cNvGrpSpPr/>
+        <p:nvPr/>
+      </p:nvGrpSpPr>
+      <p:grpSpPr>
+        <a:xfrm>
+          <a:off x="0" y="0"/>
+          <a:ext cx="0" cy="0"/>
+          <a:chOff x="0" y="0"/>
+          <a:chExt cx="0" cy="0"/>
+        </a:xfrm>
+      </p:grpSpPr>
+      <p:sp>
+        <p:nvSpPr>
+          <p:cNvPr id="2" name="Titel 1"/>
+          <p:cNvSpPr>
+            <a:spLocks noGrp="1"/>
+          </p:cNvSpPr>
+          <p:nvPr>
+            <p:ph type="title"/>
+          </p:nvPr>
+        </p:nvSpPr>
+        <p:spPr/>
+        <p:txBody>
+          <a:bodyPr/>
+          <a:lstStyle/>
+          <a:p>
+            <a:pPr algn="ctr"/>
+            <a:r>
+              <a:rPr lang="nl-NL" dirty="0" err="1"/>
+              <a:t>seaborn</a:t>
+            </a:r>
+            <a:endParaRPr lang="nl-NL" dirty="0"/>
+          </a:p>
+        </p:txBody>
+      </p:sp>
+      <p:pic>
+        <p:nvPicPr>
+          <p:cNvPr id="5" name="Afbeelding 4"/>
+          <p:cNvPicPr>
+            <a:picLocks noChangeAspect="1"/>
+          </p:cNvPicPr>
+          <p:nvPr/>
+        </p:nvPicPr>
+        <p:blipFill>
+          <a:blip r:embed="rId2"/>
+          <a:stretch>
+            <a:fillRect/>
+          </a:stretch>
+        </p:blipFill>
+        <p:spPr>
+          <a:xfrm>
+            <a:off x="1093037" y="1681162"/>
+            <a:ext cx="7229475" cy="4410075"/>
+          </a:xfrm>
+          <a:prstGeom prst="rect">
+            <a:avLst/>
+          </a:prstGeom>
+        </p:spPr>
+      </p:pic>
+    </p:spTree>
+  </p:cSld>
+  <p:clrMapOvr>
+    <a:masterClrMapping/>
+  </p:clrMapOvr>
+</p:sld>
+</file>
+
+<file path=ppt/slides/slide41.xml><?xml version="1.0" encoding="utf-8"?>
 <p:sld xmlns:a="http://schemas.openxmlformats.org/drawingml/2006/main" xmlns:r="http://schemas.openxmlformats.org/officeDocument/2006/relationships" xmlns:p="http://schemas.openxmlformats.org/presentationml/2006/main">
   <p:cSld>
     <p:spTree>
@@ -16146,7 +16320,7 @@
 </p:sld>
 </file>
 
-<file path=ppt/slides/slide41.xml><?xml version="1.0" encoding="utf-8"?>
+<file path=ppt/slides/slide42.xml><?xml version="1.0" encoding="utf-8"?>
 <p:sld xmlns:a="http://schemas.openxmlformats.org/drawingml/2006/main" xmlns:r="http://schemas.openxmlformats.org/officeDocument/2006/relationships" xmlns:p="http://schemas.openxmlformats.org/presentationml/2006/main">
   <p:cSld>
     <p:spTree>
@@ -16211,7 +16385,7 @@
 </p:sld>
 </file>
 
-<file path=ppt/slides/slide42.xml><?xml version="1.0" encoding="utf-8"?>
+<file path=ppt/slides/slide43.xml><?xml version="1.0" encoding="utf-8"?>
 <p:sld xmlns:a="http://schemas.openxmlformats.org/drawingml/2006/main" xmlns:r="http://schemas.openxmlformats.org/officeDocument/2006/relationships" xmlns:p="http://schemas.openxmlformats.org/presentationml/2006/main">
   <p:cSld>
     <p:spTree>
@@ -16305,7 +16479,7 @@
 </p:sld>
 </file>
 
-<file path=ppt/slides/slide43.xml><?xml version="1.0" encoding="utf-8"?>
+<file path=ppt/slides/slide44.xml><?xml version="1.0" encoding="utf-8"?>
 <p:sld xmlns:a="http://schemas.openxmlformats.org/drawingml/2006/main" xmlns:r="http://schemas.openxmlformats.org/officeDocument/2006/relationships" xmlns:p="http://schemas.openxmlformats.org/presentationml/2006/main">
   <p:cSld>
     <p:spTree>
@@ -16470,7 +16644,7 @@
 </p:sld>
 </file>
 
-<file path=ppt/slides/slide44.xml><?xml version="1.0" encoding="utf-8"?>
+<file path=ppt/slides/slide45.xml><?xml version="1.0" encoding="utf-8"?>
 <p:sld xmlns:a="http://schemas.openxmlformats.org/drawingml/2006/main" xmlns:r="http://schemas.openxmlformats.org/officeDocument/2006/relationships" xmlns:p="http://schemas.openxmlformats.org/presentationml/2006/main">
   <p:cSld>
     <p:spTree>
@@ -16545,7 +16719,7 @@
 </p:sld>
 </file>
 
-<file path=ppt/slides/slide45.xml><?xml version="1.0" encoding="utf-8"?>
+<file path=ppt/slides/slide46.xml><?xml version="1.0" encoding="utf-8"?>
 <p:sld xmlns:a="http://schemas.openxmlformats.org/drawingml/2006/main" xmlns:r="http://schemas.openxmlformats.org/officeDocument/2006/relationships" xmlns:p="http://schemas.openxmlformats.org/presentationml/2006/main">
   <p:cSld>
     <p:spTree>
@@ -16685,7 +16859,7 @@
 </p:sld>
 </file>
 
-<file path=ppt/slides/slide46.xml><?xml version="1.0" encoding="utf-8"?>
+<file path=ppt/slides/slide47.xml><?xml version="1.0" encoding="utf-8"?>
 <p:sld xmlns:a="http://schemas.openxmlformats.org/drawingml/2006/main" xmlns:r="http://schemas.openxmlformats.org/officeDocument/2006/relationships" xmlns:p="http://schemas.openxmlformats.org/presentationml/2006/main">
   <p:cSld>
     <p:spTree>
@@ -16825,7 +16999,7 @@
 </p:sld>
 </file>
 
-<file path=ppt/slides/slide47.xml><?xml version="1.0" encoding="utf-8"?>
+<file path=ppt/slides/slide48.xml><?xml version="1.0" encoding="utf-8"?>
 <p:sld xmlns:a="http://schemas.openxmlformats.org/drawingml/2006/main" xmlns:r="http://schemas.openxmlformats.org/officeDocument/2006/relationships" xmlns:p="http://schemas.openxmlformats.org/presentationml/2006/main">
   <p:cSld>
     <p:spTree>
@@ -16891,7 +17065,7 @@
 </p:sld>
 </file>
 
-<file path=ppt/slides/slide48.xml><?xml version="1.0" encoding="utf-8"?>
+<file path=ppt/slides/slide49.xml><?xml version="1.0" encoding="utf-8"?>
 <p:sld xmlns:a="http://schemas.openxmlformats.org/drawingml/2006/main" xmlns:r="http://schemas.openxmlformats.org/officeDocument/2006/relationships" xmlns:p="http://schemas.openxmlformats.org/presentationml/2006/main">
   <p:cSld>
     <p:spTree>
@@ -20222,175 +20396,6 @@
         <p:spPr>
           <a:xfrm>
             <a:off x="4847747" y="2092965"/>
-            <a:ext cx="5108836" cy="584775"/>
-          </a:xfrm>
-          <a:prstGeom prst="rect">
-            <a:avLst/>
-          </a:prstGeom>
-          <a:noFill/>
-        </p:spPr>
-        <p:txBody>
-          <a:bodyPr wrap="square" lIns="91440" tIns="45720" rIns="91440" bIns="45720">
-            <a:spAutoFit/>
-          </a:bodyPr>
-          <a:lstStyle/>
-          <a:p>
-            <a:pPr algn="ctr"/>
-            <a:r>
-              <a:rPr lang="nl-NL" sz="3200" dirty="0">
-                <a:ln w="0"/>
-                <a:solidFill>
-                  <a:srgbClr val="FF0000"/>
-                </a:solidFill>
-              </a:rPr>
-              <a:t>Om thuis door te lezen</a:t>
-            </a:r>
-            <a:endParaRPr lang="nl-NL" sz="3200" b="0" cap="none" spc="0" dirty="0">
-              <a:ln w="0"/>
-              <a:solidFill>
-                <a:srgbClr val="FF0000"/>
-              </a:solidFill>
-              <a:effectLst/>
-            </a:endParaRPr>
-          </a:p>
-        </p:txBody>
-      </p:sp>
-    </p:spTree>
-  </p:cSld>
-  <p:clrMapOvr>
-    <a:masterClrMapping/>
-  </p:clrMapOvr>
-  <p:timing>
-    <p:tnLst>
-      <p:par>
-        <p:cTn id="1" dur="indefinite" restart="never" nodeType="tmRoot">
-          <p:childTnLst>
-            <p:seq concurrent="1" nextAc="seek">
-              <p:cTn id="2" dur="indefinite" nodeType="mainSeq">
-                <p:childTnLst>
-                  <p:par>
-                    <p:cTn id="3" fill="hold">
-                      <p:stCondLst>
-                        <p:cond delay="indefinite"/>
-                      </p:stCondLst>
-                      <p:childTnLst>
-                        <p:par>
-                          <p:cTn id="4" fill="hold">
-                            <p:stCondLst>
-                              <p:cond delay="0"/>
-                            </p:stCondLst>
-                            <p:childTnLst>
-                              <p:par>
-                                <p:cTn id="5" presetID="1" presetClass="entr" presetSubtype="0" fill="hold" grpId="0" nodeType="clickEffect">
-                                  <p:stCondLst>
-                                    <p:cond delay="0"/>
-                                  </p:stCondLst>
-                                  <p:childTnLst>
-                                    <p:set>
-                                      <p:cBhvr>
-                                        <p:cTn id="6" dur="1" fill="hold">
-                                          <p:stCondLst>
-                                            <p:cond delay="0"/>
-                                          </p:stCondLst>
-                                        </p:cTn>
-                                        <p:tgtEl>
-                                          <p:spTgt spid="3"/>
-                                        </p:tgtEl>
-                                        <p:attrNameLst>
-                                          <p:attrName>style.visibility</p:attrName>
-                                        </p:attrNameLst>
-                                      </p:cBhvr>
-                                      <p:to>
-                                        <p:strVal val="visible"/>
-                                      </p:to>
-                                    </p:set>
-                                  </p:childTnLst>
-                                </p:cTn>
-                              </p:par>
-                            </p:childTnLst>
-                          </p:cTn>
-                        </p:par>
-                      </p:childTnLst>
-                    </p:cTn>
-                  </p:par>
-                </p:childTnLst>
-              </p:cTn>
-              <p:prevCondLst>
-                <p:cond evt="onPrev" delay="0">
-                  <p:tgtEl>
-                    <p:sldTgt/>
-                  </p:tgtEl>
-                </p:cond>
-              </p:prevCondLst>
-              <p:nextCondLst>
-                <p:cond evt="onNext" delay="0">
-                  <p:tgtEl>
-                    <p:sldTgt/>
-                  </p:tgtEl>
-                </p:cond>
-              </p:nextCondLst>
-            </p:seq>
-          </p:childTnLst>
-        </p:cTn>
-      </p:par>
-    </p:tnLst>
-    <p:bldLst>
-      <p:bldP spid="3" grpId="0"/>
-    </p:bldLst>
-  </p:timing>
-</p:sld>
-</file>
-
-<file path=ppt/slides/slide49.xml><?xml version="1.0" encoding="utf-8"?>
-<p:sld xmlns:a="http://schemas.openxmlformats.org/drawingml/2006/main" xmlns:r="http://schemas.openxmlformats.org/officeDocument/2006/relationships" xmlns:p="http://schemas.openxmlformats.org/presentationml/2006/main">
-  <p:cSld>
-    <p:spTree>
-      <p:nvGrpSpPr>
-        <p:cNvPr id="1" name=""/>
-        <p:cNvGrpSpPr/>
-        <p:nvPr/>
-      </p:nvGrpSpPr>
-      <p:grpSpPr>
-        <a:xfrm>
-          <a:off x="0" y="0"/>
-          <a:ext cx="0" cy="0"/>
-          <a:chOff x="0" y="0"/>
-          <a:chExt cx="0" cy="0"/>
-        </a:xfrm>
-      </p:grpSpPr>
-      <p:pic>
-        <p:nvPicPr>
-          <p:cNvPr id="2" name="Afbeelding 1"/>
-          <p:cNvPicPr>
-            <a:picLocks noChangeAspect="1"/>
-          </p:cNvPicPr>
-          <p:nvPr/>
-        </p:nvPicPr>
-        <p:blipFill>
-          <a:blip r:embed="rId2"/>
-          <a:stretch>
-            <a:fillRect/>
-          </a:stretch>
-        </p:blipFill>
-        <p:spPr>
-          <a:xfrm>
-            <a:off x="469263" y="245745"/>
-            <a:ext cx="8067675" cy="6000750"/>
-          </a:xfrm>
-          <a:prstGeom prst="rect">
-            <a:avLst/>
-          </a:prstGeom>
-        </p:spPr>
-      </p:pic>
-      <p:sp>
-        <p:nvSpPr>
-          <p:cNvPr id="3" name="Rechthoek 2"/>
-          <p:cNvSpPr/>
-          <p:nvPr/>
-        </p:nvSpPr>
-        <p:spPr>
-          <a:xfrm>
-            <a:off x="5346511" y="2334034"/>
             <a:ext cx="5108836" cy="584775"/>
           </a:xfrm>
           <a:prstGeom prst="rect">
@@ -20684,8 +20689,8 @@
         </p:blipFill>
         <p:spPr>
           <a:xfrm>
-            <a:off x="860107" y="341688"/>
-            <a:ext cx="8277225" cy="6191250"/>
+            <a:off x="469263" y="245745"/>
+            <a:ext cx="8067675" cy="6000750"/>
           </a:xfrm>
           <a:prstGeom prst="rect">
             <a:avLst/>
@@ -20700,7 +20705,7 @@
         </p:nvSpPr>
         <p:spPr>
           <a:xfrm>
-            <a:off x="5487827" y="2450412"/>
+            <a:off x="5346511" y="2334034"/>
             <a:ext cx="5108836" cy="584775"/>
           </a:xfrm>
           <a:prstGeom prst="rect">
@@ -20821,6 +20826,175 @@
 </file>
 
 <file path=ppt/slides/slide51.xml><?xml version="1.0" encoding="utf-8"?>
+<p:sld xmlns:a="http://schemas.openxmlformats.org/drawingml/2006/main" xmlns:r="http://schemas.openxmlformats.org/officeDocument/2006/relationships" xmlns:p="http://schemas.openxmlformats.org/presentationml/2006/main">
+  <p:cSld>
+    <p:spTree>
+      <p:nvGrpSpPr>
+        <p:cNvPr id="1" name=""/>
+        <p:cNvGrpSpPr/>
+        <p:nvPr/>
+      </p:nvGrpSpPr>
+      <p:grpSpPr>
+        <a:xfrm>
+          <a:off x="0" y="0"/>
+          <a:ext cx="0" cy="0"/>
+          <a:chOff x="0" y="0"/>
+          <a:chExt cx="0" cy="0"/>
+        </a:xfrm>
+      </p:grpSpPr>
+      <p:pic>
+        <p:nvPicPr>
+          <p:cNvPr id="2" name="Afbeelding 1"/>
+          <p:cNvPicPr>
+            <a:picLocks noChangeAspect="1"/>
+          </p:cNvPicPr>
+          <p:nvPr/>
+        </p:nvPicPr>
+        <p:blipFill>
+          <a:blip r:embed="rId2"/>
+          <a:stretch>
+            <a:fillRect/>
+          </a:stretch>
+        </p:blipFill>
+        <p:spPr>
+          <a:xfrm>
+            <a:off x="860107" y="341688"/>
+            <a:ext cx="8277225" cy="6191250"/>
+          </a:xfrm>
+          <a:prstGeom prst="rect">
+            <a:avLst/>
+          </a:prstGeom>
+        </p:spPr>
+      </p:pic>
+      <p:sp>
+        <p:nvSpPr>
+          <p:cNvPr id="3" name="Rechthoek 2"/>
+          <p:cNvSpPr/>
+          <p:nvPr/>
+        </p:nvSpPr>
+        <p:spPr>
+          <a:xfrm>
+            <a:off x="5487827" y="2450412"/>
+            <a:ext cx="5108836" cy="584775"/>
+          </a:xfrm>
+          <a:prstGeom prst="rect">
+            <a:avLst/>
+          </a:prstGeom>
+          <a:noFill/>
+        </p:spPr>
+        <p:txBody>
+          <a:bodyPr wrap="square" lIns="91440" tIns="45720" rIns="91440" bIns="45720">
+            <a:spAutoFit/>
+          </a:bodyPr>
+          <a:lstStyle/>
+          <a:p>
+            <a:pPr algn="ctr"/>
+            <a:r>
+              <a:rPr lang="nl-NL" sz="3200" dirty="0">
+                <a:ln w="0"/>
+                <a:solidFill>
+                  <a:srgbClr val="FF0000"/>
+                </a:solidFill>
+              </a:rPr>
+              <a:t>Om thuis door te lezen</a:t>
+            </a:r>
+            <a:endParaRPr lang="nl-NL" sz="3200" b="0" cap="none" spc="0" dirty="0">
+              <a:ln w="0"/>
+              <a:solidFill>
+                <a:srgbClr val="FF0000"/>
+              </a:solidFill>
+              <a:effectLst/>
+            </a:endParaRPr>
+          </a:p>
+        </p:txBody>
+      </p:sp>
+    </p:spTree>
+  </p:cSld>
+  <p:clrMapOvr>
+    <a:masterClrMapping/>
+  </p:clrMapOvr>
+  <p:timing>
+    <p:tnLst>
+      <p:par>
+        <p:cTn id="1" dur="indefinite" restart="never" nodeType="tmRoot">
+          <p:childTnLst>
+            <p:seq concurrent="1" nextAc="seek">
+              <p:cTn id="2" dur="indefinite" nodeType="mainSeq">
+                <p:childTnLst>
+                  <p:par>
+                    <p:cTn id="3" fill="hold">
+                      <p:stCondLst>
+                        <p:cond delay="indefinite"/>
+                      </p:stCondLst>
+                      <p:childTnLst>
+                        <p:par>
+                          <p:cTn id="4" fill="hold">
+                            <p:stCondLst>
+                              <p:cond delay="0"/>
+                            </p:stCondLst>
+                            <p:childTnLst>
+                              <p:par>
+                                <p:cTn id="5" presetID="1" presetClass="entr" presetSubtype="0" fill="hold" grpId="0" nodeType="clickEffect">
+                                  <p:stCondLst>
+                                    <p:cond delay="0"/>
+                                  </p:stCondLst>
+                                  <p:childTnLst>
+                                    <p:set>
+                                      <p:cBhvr>
+                                        <p:cTn id="6" dur="1" fill="hold">
+                                          <p:stCondLst>
+                                            <p:cond delay="0"/>
+                                          </p:stCondLst>
+                                        </p:cTn>
+                                        <p:tgtEl>
+                                          <p:spTgt spid="3"/>
+                                        </p:tgtEl>
+                                        <p:attrNameLst>
+                                          <p:attrName>style.visibility</p:attrName>
+                                        </p:attrNameLst>
+                                      </p:cBhvr>
+                                      <p:to>
+                                        <p:strVal val="visible"/>
+                                      </p:to>
+                                    </p:set>
+                                  </p:childTnLst>
+                                </p:cTn>
+                              </p:par>
+                            </p:childTnLst>
+                          </p:cTn>
+                        </p:par>
+                      </p:childTnLst>
+                    </p:cTn>
+                  </p:par>
+                </p:childTnLst>
+              </p:cTn>
+              <p:prevCondLst>
+                <p:cond evt="onPrev" delay="0">
+                  <p:tgtEl>
+                    <p:sldTgt/>
+                  </p:tgtEl>
+                </p:cond>
+              </p:prevCondLst>
+              <p:nextCondLst>
+                <p:cond evt="onNext" delay="0">
+                  <p:tgtEl>
+                    <p:sldTgt/>
+                  </p:tgtEl>
+                </p:cond>
+              </p:nextCondLst>
+            </p:seq>
+          </p:childTnLst>
+        </p:cTn>
+      </p:par>
+    </p:tnLst>
+    <p:bldLst>
+      <p:bldP spid="3" grpId="0"/>
+    </p:bldLst>
+  </p:timing>
+</p:sld>
+</file>
+
+<file path=ppt/slides/slide52.xml><?xml version="1.0" encoding="utf-8"?>
 <p:sld xmlns:a="http://schemas.openxmlformats.org/drawingml/2006/main" xmlns:r="http://schemas.openxmlformats.org/officeDocument/2006/relationships" xmlns:p="http://schemas.openxmlformats.org/presentationml/2006/main">
   <p:cSld>
     <p:spTree>

</xml_diff>